<commit_message>
Update to Calendar and notes on quiz 1 Slides for Lecture 5
</commit_message>
<xml_diff>
--- a/mquizzes/mquiz0/instructor/mquiz0_figures.pptx
+++ b/mquizzes/mquiz0/instructor/mquiz0_figures.pptx
@@ -8,6 +8,8 @@
     <p:sldId id="256" r:id="rId2"/>
     <p:sldId id="258" r:id="rId3"/>
     <p:sldId id="257" r:id="rId4"/>
+    <p:sldId id="259" r:id="rId5"/>
+    <p:sldId id="260" r:id="rId6"/>
   </p:sldIdLst>
   <p:sldSz cx="12192000" cy="6858000"/>
   <p:notesSz cx="6858000" cy="9144000"/>
@@ -106,6 +108,11 @@
       </a:defRPr>
     </a:lvl9pPr>
   </p:defaultTextStyle>
+  <p:extLst>
+    <p:ext uri="{EFAFB233-063F-42B5-8137-9DF3F51BA10A}">
+      <p15:sldGuideLst xmlns:p15="http://schemas.microsoft.com/office/powerpoint/2012/main"/>
+    </p:ext>
+  </p:extLst>
 </p:presentation>
 </file>
 
@@ -256,7 +263,7 @@
           <a:p>
             <a:fld id="{7550904D-5368-AB4C-A0C9-3470548BAA6C}" type="datetimeFigureOut">
               <a:rPr lang="en-US" smtClean="0"/>
-              <a:t>1/27/21</a:t>
+              <a:t>2/3/21</a:t>
             </a:fld>
             <a:endParaRPr lang="en-US"/>
           </a:p>
@@ -454,7 +461,7 @@
           <a:p>
             <a:fld id="{7550904D-5368-AB4C-A0C9-3470548BAA6C}" type="datetimeFigureOut">
               <a:rPr lang="en-US" smtClean="0"/>
-              <a:t>1/27/21</a:t>
+              <a:t>2/3/21</a:t>
             </a:fld>
             <a:endParaRPr lang="en-US"/>
           </a:p>
@@ -662,7 +669,7 @@
           <a:p>
             <a:fld id="{7550904D-5368-AB4C-A0C9-3470548BAA6C}" type="datetimeFigureOut">
               <a:rPr lang="en-US" smtClean="0"/>
-              <a:t>1/27/21</a:t>
+              <a:t>2/3/21</a:t>
             </a:fld>
             <a:endParaRPr lang="en-US"/>
           </a:p>
@@ -860,7 +867,7 @@
           <a:p>
             <a:fld id="{7550904D-5368-AB4C-A0C9-3470548BAA6C}" type="datetimeFigureOut">
               <a:rPr lang="en-US" smtClean="0"/>
-              <a:t>1/27/21</a:t>
+              <a:t>2/3/21</a:t>
             </a:fld>
             <a:endParaRPr lang="en-US"/>
           </a:p>
@@ -1135,7 +1142,7 @@
           <a:p>
             <a:fld id="{7550904D-5368-AB4C-A0C9-3470548BAA6C}" type="datetimeFigureOut">
               <a:rPr lang="en-US" smtClean="0"/>
-              <a:t>1/27/21</a:t>
+              <a:t>2/3/21</a:t>
             </a:fld>
             <a:endParaRPr lang="en-US"/>
           </a:p>
@@ -1400,7 +1407,7 @@
           <a:p>
             <a:fld id="{7550904D-5368-AB4C-A0C9-3470548BAA6C}" type="datetimeFigureOut">
               <a:rPr lang="en-US" smtClean="0"/>
-              <a:t>1/27/21</a:t>
+              <a:t>2/3/21</a:t>
             </a:fld>
             <a:endParaRPr lang="en-US"/>
           </a:p>
@@ -1812,7 +1819,7 @@
           <a:p>
             <a:fld id="{7550904D-5368-AB4C-A0C9-3470548BAA6C}" type="datetimeFigureOut">
               <a:rPr lang="en-US" smtClean="0"/>
-              <a:t>1/27/21</a:t>
+              <a:t>2/3/21</a:t>
             </a:fld>
             <a:endParaRPr lang="en-US"/>
           </a:p>
@@ -1953,7 +1960,7 @@
           <a:p>
             <a:fld id="{7550904D-5368-AB4C-A0C9-3470548BAA6C}" type="datetimeFigureOut">
               <a:rPr lang="en-US" smtClean="0"/>
-              <a:t>1/27/21</a:t>
+              <a:t>2/3/21</a:t>
             </a:fld>
             <a:endParaRPr lang="en-US"/>
           </a:p>
@@ -2066,7 +2073,7 @@
           <a:p>
             <a:fld id="{7550904D-5368-AB4C-A0C9-3470548BAA6C}" type="datetimeFigureOut">
               <a:rPr lang="en-US" smtClean="0"/>
-              <a:t>1/27/21</a:t>
+              <a:t>2/3/21</a:t>
             </a:fld>
             <a:endParaRPr lang="en-US"/>
           </a:p>
@@ -2377,7 +2384,7 @@
           <a:p>
             <a:fld id="{7550904D-5368-AB4C-A0C9-3470548BAA6C}" type="datetimeFigureOut">
               <a:rPr lang="en-US" smtClean="0"/>
-              <a:t>1/27/21</a:t>
+              <a:t>2/3/21</a:t>
             </a:fld>
             <a:endParaRPr lang="en-US"/>
           </a:p>
@@ -2665,7 +2672,7 @@
           <a:p>
             <a:fld id="{7550904D-5368-AB4C-A0C9-3470548BAA6C}" type="datetimeFigureOut">
               <a:rPr lang="en-US" smtClean="0"/>
-              <a:t>1/27/21</a:t>
+              <a:t>2/3/21</a:t>
             </a:fld>
             <a:endParaRPr lang="en-US"/>
           </a:p>
@@ -2906,7 +2913,7 @@
           <a:p>
             <a:fld id="{7550904D-5368-AB4C-A0C9-3470548BAA6C}" type="datetimeFigureOut">
               <a:rPr lang="en-US" smtClean="0"/>
-              <a:t>1/27/21</a:t>
+              <a:t>2/3/21</a:t>
             </a:fld>
             <a:endParaRPr lang="en-US"/>
           </a:p>
@@ -7402,6 +7409,3219 @@
 </p:sld>
 </file>
 
+<file path=ppt/slides/slide4.xml><?xml version="1.0" encoding="utf-8"?>
+<p:sld xmlns:a="http://schemas.openxmlformats.org/drawingml/2006/main" xmlns:r="http://schemas.openxmlformats.org/officeDocument/2006/relationships" xmlns:p="http://schemas.openxmlformats.org/presentationml/2006/main">
+  <p:cSld>
+    <p:spTree>
+      <p:nvGrpSpPr>
+        <p:cNvPr id="1" name=""/>
+        <p:cNvGrpSpPr/>
+        <p:nvPr/>
+      </p:nvGrpSpPr>
+      <p:grpSpPr>
+        <a:xfrm>
+          <a:off x="0" y="0"/>
+          <a:ext cx="0" cy="0"/>
+          <a:chOff x="0" y="0"/>
+          <a:chExt cx="0" cy="0"/>
+        </a:xfrm>
+      </p:grpSpPr>
+      <p:sp>
+        <p:nvSpPr>
+          <p:cNvPr id="4" name="Oval 3">
+            <a:extLst>
+              <a:ext uri="{FF2B5EF4-FFF2-40B4-BE49-F238E27FC236}">
+                <a16:creationId xmlns:a16="http://schemas.microsoft.com/office/drawing/2014/main" id="{8170DB37-4E0B-D747-ADB9-1EE37C3598EA}"/>
+              </a:ext>
+            </a:extLst>
+          </p:cNvPr>
+          <p:cNvSpPr>
+            <a:spLocks noChangeAspect="1"/>
+          </p:cNvSpPr>
+          <p:nvPr/>
+        </p:nvSpPr>
+        <p:spPr>
+          <a:xfrm>
+            <a:off x="798256" y="2608669"/>
+            <a:ext cx="594360" cy="594360"/>
+          </a:xfrm>
+          <a:prstGeom prst="ellipse">
+            <a:avLst/>
+          </a:prstGeom>
+          <a:noFill/>
+          <a:ln>
+            <a:solidFill>
+              <a:schemeClr val="tx1"/>
+            </a:solidFill>
+          </a:ln>
+        </p:spPr>
+        <p:style>
+          <a:lnRef idx="2">
+            <a:schemeClr val="accent1">
+              <a:shade val="50000"/>
+            </a:schemeClr>
+          </a:lnRef>
+          <a:fillRef idx="1">
+            <a:schemeClr val="accent1"/>
+          </a:fillRef>
+          <a:effectRef idx="0">
+            <a:schemeClr val="accent1"/>
+          </a:effectRef>
+          <a:fontRef idx="minor">
+            <a:schemeClr val="lt1"/>
+          </a:fontRef>
+        </p:style>
+        <p:txBody>
+          <a:bodyPr rtlCol="0" anchor="ctr"/>
+          <a:lstStyle/>
+          <a:p>
+            <a:pPr algn="ctr"/>
+            <a:endParaRPr lang="en-US"/>
+          </a:p>
+        </p:txBody>
+      </p:sp>
+      <p:sp>
+        <p:nvSpPr>
+          <p:cNvPr id="5" name="TextBox 4">
+            <a:extLst>
+              <a:ext uri="{FF2B5EF4-FFF2-40B4-BE49-F238E27FC236}">
+                <a16:creationId xmlns:a16="http://schemas.microsoft.com/office/drawing/2014/main" id="{2A2E312C-4676-7A45-B466-4647C37E4865}"/>
+              </a:ext>
+            </a:extLst>
+          </p:cNvPr>
+          <p:cNvSpPr txBox="1"/>
+          <p:nvPr/>
+        </p:nvSpPr>
+        <p:spPr>
+          <a:xfrm>
+            <a:off x="848345" y="2592625"/>
+            <a:ext cx="542136" cy="584775"/>
+          </a:xfrm>
+          <a:prstGeom prst="rect">
+            <a:avLst/>
+          </a:prstGeom>
+          <a:noFill/>
+        </p:spPr>
+        <p:txBody>
+          <a:bodyPr wrap="none" rtlCol="0">
+            <a:spAutoFit/>
+          </a:bodyPr>
+          <a:lstStyle/>
+          <a:p>
+            <a:pPr algn="ctr"/>
+            <a:r>
+              <a:rPr lang="en-US" b="1" dirty="0"/>
+              <a:t>S</a:t>
+            </a:r>
+          </a:p>
+          <a:p>
+            <a:pPr algn="ctr"/>
+            <a:r>
+              <a:rPr lang="en-US" sz="1400" b="1" dirty="0"/>
+              <a:t>h = 5</a:t>
+            </a:r>
+          </a:p>
+        </p:txBody>
+      </p:sp>
+      <p:cxnSp>
+        <p:nvCxnSpPr>
+          <p:cNvPr id="6" name="Straight Arrow Connector 5">
+            <a:extLst>
+              <a:ext uri="{FF2B5EF4-FFF2-40B4-BE49-F238E27FC236}">
+                <a16:creationId xmlns:a16="http://schemas.microsoft.com/office/drawing/2014/main" id="{FE6122A6-830E-534F-889F-83E7029BEA9B}"/>
+              </a:ext>
+            </a:extLst>
+          </p:cNvPr>
+          <p:cNvCxnSpPr>
+            <a:cxnSpLocks/>
+            <a:stCxn id="4" idx="7"/>
+            <a:endCxn id="7" idx="3"/>
+          </p:cNvCxnSpPr>
+          <p:nvPr/>
+        </p:nvCxnSpPr>
+        <p:spPr>
+          <a:xfrm flipV="1">
+            <a:off x="1305574" y="1158141"/>
+            <a:ext cx="751434" cy="1537570"/>
+          </a:xfrm>
+          <a:prstGeom prst="straightConnector1">
+            <a:avLst/>
+          </a:prstGeom>
+          <a:ln w="25400">
+            <a:solidFill>
+              <a:schemeClr val="tx1"/>
+            </a:solidFill>
+            <a:tailEnd type="triangle" w="lg" len="lg"/>
+          </a:ln>
+        </p:spPr>
+        <p:style>
+          <a:lnRef idx="1">
+            <a:schemeClr val="accent1"/>
+          </a:lnRef>
+          <a:fillRef idx="0">
+            <a:schemeClr val="accent1"/>
+          </a:fillRef>
+          <a:effectRef idx="0">
+            <a:schemeClr val="accent1"/>
+          </a:effectRef>
+          <a:fontRef idx="minor">
+            <a:schemeClr val="tx1"/>
+          </a:fontRef>
+        </p:style>
+      </p:cxnSp>
+      <p:sp>
+        <p:nvSpPr>
+          <p:cNvPr id="7" name="Oval 6">
+            <a:extLst>
+              <a:ext uri="{FF2B5EF4-FFF2-40B4-BE49-F238E27FC236}">
+                <a16:creationId xmlns:a16="http://schemas.microsoft.com/office/drawing/2014/main" id="{B707FB6A-ACE9-7346-99F4-6BBBB03361BB}"/>
+              </a:ext>
+            </a:extLst>
+          </p:cNvPr>
+          <p:cNvSpPr>
+            <a:spLocks noChangeAspect="1"/>
+          </p:cNvSpPr>
+          <p:nvPr/>
+        </p:nvSpPr>
+        <p:spPr>
+          <a:xfrm>
+            <a:off x="1969966" y="650823"/>
+            <a:ext cx="594360" cy="594360"/>
+          </a:xfrm>
+          <a:prstGeom prst="ellipse">
+            <a:avLst/>
+          </a:prstGeom>
+          <a:noFill/>
+          <a:ln>
+            <a:solidFill>
+              <a:schemeClr val="tx1"/>
+            </a:solidFill>
+          </a:ln>
+        </p:spPr>
+        <p:style>
+          <a:lnRef idx="2">
+            <a:schemeClr val="accent1">
+              <a:shade val="50000"/>
+            </a:schemeClr>
+          </a:lnRef>
+          <a:fillRef idx="1">
+            <a:schemeClr val="accent1"/>
+          </a:fillRef>
+          <a:effectRef idx="0">
+            <a:schemeClr val="accent1"/>
+          </a:effectRef>
+          <a:fontRef idx="minor">
+            <a:schemeClr val="lt1"/>
+          </a:fontRef>
+        </p:style>
+        <p:txBody>
+          <a:bodyPr rtlCol="0" anchor="ctr"/>
+          <a:lstStyle/>
+          <a:p>
+            <a:pPr algn="ctr"/>
+            <a:endParaRPr lang="en-US"/>
+          </a:p>
+        </p:txBody>
+      </p:sp>
+      <p:sp>
+        <p:nvSpPr>
+          <p:cNvPr id="8" name="TextBox 7">
+            <a:extLst>
+              <a:ext uri="{FF2B5EF4-FFF2-40B4-BE49-F238E27FC236}">
+                <a16:creationId xmlns:a16="http://schemas.microsoft.com/office/drawing/2014/main" id="{856A44B5-84EC-1F4E-83FB-30603F8AEB7A}"/>
+              </a:ext>
+            </a:extLst>
+          </p:cNvPr>
+          <p:cNvSpPr txBox="1"/>
+          <p:nvPr/>
+        </p:nvSpPr>
+        <p:spPr>
+          <a:xfrm>
+            <a:off x="1989417" y="665112"/>
+            <a:ext cx="542136" cy="584775"/>
+          </a:xfrm>
+          <a:prstGeom prst="rect">
+            <a:avLst/>
+          </a:prstGeom>
+          <a:noFill/>
+        </p:spPr>
+        <p:txBody>
+          <a:bodyPr wrap="none" rtlCol="0">
+            <a:spAutoFit/>
+          </a:bodyPr>
+          <a:lstStyle/>
+          <a:p>
+            <a:pPr algn="ctr"/>
+            <a:r>
+              <a:rPr lang="en-US" b="1" dirty="0"/>
+              <a:t>A</a:t>
+            </a:r>
+          </a:p>
+          <a:p>
+            <a:pPr algn="ctr"/>
+            <a:r>
+              <a:rPr lang="en-US" sz="1400" b="1" dirty="0"/>
+              <a:t>h = 3</a:t>
+            </a:r>
+          </a:p>
+        </p:txBody>
+      </p:sp>
+      <p:cxnSp>
+        <p:nvCxnSpPr>
+          <p:cNvPr id="9" name="Straight Arrow Connector 8">
+            <a:extLst>
+              <a:ext uri="{FF2B5EF4-FFF2-40B4-BE49-F238E27FC236}">
+                <a16:creationId xmlns:a16="http://schemas.microsoft.com/office/drawing/2014/main" id="{FC5F2926-4B22-7B4D-BFEF-60533C94DB6E}"/>
+              </a:ext>
+            </a:extLst>
+          </p:cNvPr>
+          <p:cNvCxnSpPr>
+            <a:cxnSpLocks/>
+            <a:stCxn id="4" idx="6"/>
+            <a:endCxn id="10" idx="2"/>
+          </p:cNvCxnSpPr>
+          <p:nvPr/>
+        </p:nvCxnSpPr>
+        <p:spPr>
+          <a:xfrm flipV="1">
+            <a:off x="1392616" y="2398531"/>
+            <a:ext cx="1145360" cy="507318"/>
+          </a:xfrm>
+          <a:prstGeom prst="straightConnector1">
+            <a:avLst/>
+          </a:prstGeom>
+          <a:ln w="25400">
+            <a:solidFill>
+              <a:schemeClr val="tx1"/>
+            </a:solidFill>
+            <a:tailEnd type="triangle" w="lg" len="lg"/>
+          </a:ln>
+        </p:spPr>
+        <p:style>
+          <a:lnRef idx="1">
+            <a:schemeClr val="accent1"/>
+          </a:lnRef>
+          <a:fillRef idx="0">
+            <a:schemeClr val="accent1"/>
+          </a:fillRef>
+          <a:effectRef idx="0">
+            <a:schemeClr val="accent1"/>
+          </a:effectRef>
+          <a:fontRef idx="minor">
+            <a:schemeClr val="tx1"/>
+          </a:fontRef>
+        </p:style>
+      </p:cxnSp>
+      <p:sp>
+        <p:nvSpPr>
+          <p:cNvPr id="10" name="Oval 9">
+            <a:extLst>
+              <a:ext uri="{FF2B5EF4-FFF2-40B4-BE49-F238E27FC236}">
+                <a16:creationId xmlns:a16="http://schemas.microsoft.com/office/drawing/2014/main" id="{EBFA95C8-C184-E54F-8F71-C6B37F4031E8}"/>
+              </a:ext>
+            </a:extLst>
+          </p:cNvPr>
+          <p:cNvSpPr>
+            <a:spLocks noChangeAspect="1"/>
+          </p:cNvSpPr>
+          <p:nvPr/>
+        </p:nvSpPr>
+        <p:spPr>
+          <a:xfrm>
+            <a:off x="2537976" y="2101351"/>
+            <a:ext cx="594360" cy="594360"/>
+          </a:xfrm>
+          <a:prstGeom prst="ellipse">
+            <a:avLst/>
+          </a:prstGeom>
+          <a:noFill/>
+          <a:ln>
+            <a:solidFill>
+              <a:schemeClr val="tx1"/>
+            </a:solidFill>
+          </a:ln>
+        </p:spPr>
+        <p:style>
+          <a:lnRef idx="2">
+            <a:schemeClr val="accent1">
+              <a:shade val="50000"/>
+            </a:schemeClr>
+          </a:lnRef>
+          <a:fillRef idx="1">
+            <a:schemeClr val="accent1"/>
+          </a:fillRef>
+          <a:effectRef idx="0">
+            <a:schemeClr val="accent1"/>
+          </a:effectRef>
+          <a:fontRef idx="minor">
+            <a:schemeClr val="lt1"/>
+          </a:fontRef>
+        </p:style>
+        <p:txBody>
+          <a:bodyPr rtlCol="0" anchor="ctr"/>
+          <a:lstStyle/>
+          <a:p>
+            <a:pPr algn="ctr"/>
+            <a:endParaRPr lang="en-US"/>
+          </a:p>
+        </p:txBody>
+      </p:sp>
+      <p:sp>
+        <p:nvSpPr>
+          <p:cNvPr id="11" name="TextBox 10">
+            <a:extLst>
+              <a:ext uri="{FF2B5EF4-FFF2-40B4-BE49-F238E27FC236}">
+                <a16:creationId xmlns:a16="http://schemas.microsoft.com/office/drawing/2014/main" id="{D9F9C500-3C19-5140-B9D4-D396867492A2}"/>
+              </a:ext>
+            </a:extLst>
+          </p:cNvPr>
+          <p:cNvSpPr txBox="1"/>
+          <p:nvPr/>
+        </p:nvSpPr>
+        <p:spPr>
+          <a:xfrm>
+            <a:off x="2566642" y="2124215"/>
+            <a:ext cx="542136" cy="584775"/>
+          </a:xfrm>
+          <a:prstGeom prst="rect">
+            <a:avLst/>
+          </a:prstGeom>
+          <a:noFill/>
+        </p:spPr>
+        <p:txBody>
+          <a:bodyPr wrap="none" rtlCol="0">
+            <a:spAutoFit/>
+          </a:bodyPr>
+          <a:lstStyle/>
+          <a:p>
+            <a:pPr algn="ctr"/>
+            <a:r>
+              <a:rPr lang="en-US" b="1" dirty="0"/>
+              <a:t>B</a:t>
+            </a:r>
+          </a:p>
+          <a:p>
+            <a:pPr algn="ctr"/>
+            <a:r>
+              <a:rPr lang="en-US" sz="1400" b="1" dirty="0"/>
+              <a:t>h = 4</a:t>
+            </a:r>
+          </a:p>
+        </p:txBody>
+      </p:sp>
+      <p:cxnSp>
+        <p:nvCxnSpPr>
+          <p:cNvPr id="13" name="Straight Arrow Connector 12">
+            <a:extLst>
+              <a:ext uri="{FF2B5EF4-FFF2-40B4-BE49-F238E27FC236}">
+                <a16:creationId xmlns:a16="http://schemas.microsoft.com/office/drawing/2014/main" id="{E5D7FB97-8A19-6B42-84DE-0BA4E1C78F6F}"/>
+              </a:ext>
+            </a:extLst>
+          </p:cNvPr>
+          <p:cNvCxnSpPr>
+            <a:cxnSpLocks/>
+            <a:stCxn id="10" idx="7"/>
+            <a:endCxn id="14" idx="3"/>
+          </p:cNvCxnSpPr>
+          <p:nvPr/>
+        </p:nvCxnSpPr>
+        <p:spPr>
+          <a:xfrm flipV="1">
+            <a:off x="3045294" y="1685522"/>
+            <a:ext cx="293727" cy="502871"/>
+          </a:xfrm>
+          <a:prstGeom prst="straightConnector1">
+            <a:avLst/>
+          </a:prstGeom>
+          <a:ln w="25400">
+            <a:solidFill>
+              <a:schemeClr val="tx1"/>
+            </a:solidFill>
+            <a:tailEnd type="triangle" w="lg" len="lg"/>
+          </a:ln>
+        </p:spPr>
+        <p:style>
+          <a:lnRef idx="1">
+            <a:schemeClr val="accent1"/>
+          </a:lnRef>
+          <a:fillRef idx="0">
+            <a:schemeClr val="accent1"/>
+          </a:fillRef>
+          <a:effectRef idx="0">
+            <a:schemeClr val="accent1"/>
+          </a:effectRef>
+          <a:fontRef idx="minor">
+            <a:schemeClr val="tx1"/>
+          </a:fontRef>
+        </p:style>
+      </p:cxnSp>
+      <p:sp>
+        <p:nvSpPr>
+          <p:cNvPr id="14" name="Oval 13">
+            <a:extLst>
+              <a:ext uri="{FF2B5EF4-FFF2-40B4-BE49-F238E27FC236}">
+                <a16:creationId xmlns:a16="http://schemas.microsoft.com/office/drawing/2014/main" id="{BB44DB84-F162-6D47-88D5-73DD5A30D2C5}"/>
+              </a:ext>
+            </a:extLst>
+          </p:cNvPr>
+          <p:cNvSpPr>
+            <a:spLocks noChangeAspect="1"/>
+          </p:cNvSpPr>
+          <p:nvPr/>
+        </p:nvSpPr>
+        <p:spPr>
+          <a:xfrm>
+            <a:off x="3251979" y="1178204"/>
+            <a:ext cx="594360" cy="594360"/>
+          </a:xfrm>
+          <a:prstGeom prst="ellipse">
+            <a:avLst/>
+          </a:prstGeom>
+          <a:noFill/>
+          <a:ln>
+            <a:solidFill>
+              <a:schemeClr val="tx1"/>
+            </a:solidFill>
+          </a:ln>
+        </p:spPr>
+        <p:style>
+          <a:lnRef idx="2">
+            <a:schemeClr val="accent1">
+              <a:shade val="50000"/>
+            </a:schemeClr>
+          </a:lnRef>
+          <a:fillRef idx="1">
+            <a:schemeClr val="accent1"/>
+          </a:fillRef>
+          <a:effectRef idx="0">
+            <a:schemeClr val="accent1"/>
+          </a:effectRef>
+          <a:fontRef idx="minor">
+            <a:schemeClr val="lt1"/>
+          </a:fontRef>
+        </p:style>
+        <p:txBody>
+          <a:bodyPr rtlCol="0" anchor="ctr"/>
+          <a:lstStyle/>
+          <a:p>
+            <a:pPr algn="ctr"/>
+            <a:endParaRPr lang="en-US"/>
+          </a:p>
+        </p:txBody>
+      </p:sp>
+      <p:sp>
+        <p:nvSpPr>
+          <p:cNvPr id="17" name="Oval 16">
+            <a:extLst>
+              <a:ext uri="{FF2B5EF4-FFF2-40B4-BE49-F238E27FC236}">
+                <a16:creationId xmlns:a16="http://schemas.microsoft.com/office/drawing/2014/main" id="{060539F7-0195-E54D-A775-A9FAD4464FE7}"/>
+              </a:ext>
+            </a:extLst>
+          </p:cNvPr>
+          <p:cNvSpPr>
+            <a:spLocks noChangeAspect="1"/>
+          </p:cNvSpPr>
+          <p:nvPr/>
+        </p:nvSpPr>
+        <p:spPr>
+          <a:xfrm>
+            <a:off x="4176101" y="2101351"/>
+            <a:ext cx="594360" cy="594360"/>
+          </a:xfrm>
+          <a:prstGeom prst="ellipse">
+            <a:avLst/>
+          </a:prstGeom>
+          <a:noFill/>
+          <a:ln>
+            <a:solidFill>
+              <a:schemeClr val="tx1"/>
+            </a:solidFill>
+          </a:ln>
+        </p:spPr>
+        <p:style>
+          <a:lnRef idx="2">
+            <a:schemeClr val="accent1">
+              <a:shade val="50000"/>
+            </a:schemeClr>
+          </a:lnRef>
+          <a:fillRef idx="1">
+            <a:schemeClr val="accent1"/>
+          </a:fillRef>
+          <a:effectRef idx="0">
+            <a:schemeClr val="accent1"/>
+          </a:effectRef>
+          <a:fontRef idx="minor">
+            <a:schemeClr val="lt1"/>
+          </a:fontRef>
+        </p:style>
+        <p:txBody>
+          <a:bodyPr rtlCol="0" anchor="ctr"/>
+          <a:lstStyle/>
+          <a:p>
+            <a:pPr algn="ctr"/>
+            <a:endParaRPr lang="en-US"/>
+          </a:p>
+        </p:txBody>
+      </p:sp>
+      <p:sp>
+        <p:nvSpPr>
+          <p:cNvPr id="18" name="TextBox 17">
+            <a:extLst>
+              <a:ext uri="{FF2B5EF4-FFF2-40B4-BE49-F238E27FC236}">
+                <a16:creationId xmlns:a16="http://schemas.microsoft.com/office/drawing/2014/main" id="{E8438F7C-6E32-5C45-8EF4-F7DFF010B402}"/>
+              </a:ext>
+            </a:extLst>
+          </p:cNvPr>
+          <p:cNvSpPr txBox="1"/>
+          <p:nvPr/>
+        </p:nvSpPr>
+        <p:spPr>
+          <a:xfrm>
+            <a:off x="4210642" y="2122851"/>
+            <a:ext cx="542136" cy="584775"/>
+          </a:xfrm>
+          <a:prstGeom prst="rect">
+            <a:avLst/>
+          </a:prstGeom>
+          <a:noFill/>
+        </p:spPr>
+        <p:txBody>
+          <a:bodyPr wrap="none" rtlCol="0">
+            <a:spAutoFit/>
+          </a:bodyPr>
+          <a:lstStyle/>
+          <a:p>
+            <a:pPr algn="ctr"/>
+            <a:r>
+              <a:rPr lang="en-US" b="1" dirty="0"/>
+              <a:t>D</a:t>
+            </a:r>
+          </a:p>
+          <a:p>
+            <a:pPr algn="ctr"/>
+            <a:r>
+              <a:rPr lang="en-US" sz="1400" b="1" dirty="0"/>
+              <a:t>h = 5</a:t>
+            </a:r>
+          </a:p>
+        </p:txBody>
+      </p:sp>
+      <p:cxnSp>
+        <p:nvCxnSpPr>
+          <p:cNvPr id="19" name="Straight Arrow Connector 18">
+            <a:extLst>
+              <a:ext uri="{FF2B5EF4-FFF2-40B4-BE49-F238E27FC236}">
+                <a16:creationId xmlns:a16="http://schemas.microsoft.com/office/drawing/2014/main" id="{C696F5A2-9DF3-8A48-92D6-583BFFA09347}"/>
+              </a:ext>
+            </a:extLst>
+          </p:cNvPr>
+          <p:cNvCxnSpPr>
+            <a:cxnSpLocks/>
+            <a:stCxn id="10" idx="6"/>
+            <a:endCxn id="17" idx="2"/>
+          </p:cNvCxnSpPr>
+          <p:nvPr/>
+        </p:nvCxnSpPr>
+        <p:spPr>
+          <a:xfrm>
+            <a:off x="3132336" y="2398531"/>
+            <a:ext cx="1043765" cy="0"/>
+          </a:xfrm>
+          <a:prstGeom prst="straightConnector1">
+            <a:avLst/>
+          </a:prstGeom>
+          <a:ln w="25400">
+            <a:solidFill>
+              <a:schemeClr val="tx1"/>
+            </a:solidFill>
+            <a:tailEnd type="triangle" w="lg" len="lg"/>
+          </a:ln>
+        </p:spPr>
+        <p:style>
+          <a:lnRef idx="1">
+            <a:schemeClr val="accent1"/>
+          </a:lnRef>
+          <a:fillRef idx="0">
+            <a:schemeClr val="accent1"/>
+          </a:fillRef>
+          <a:effectRef idx="0">
+            <a:schemeClr val="accent1"/>
+          </a:effectRef>
+          <a:fontRef idx="minor">
+            <a:schemeClr val="tx1"/>
+          </a:fontRef>
+        </p:style>
+      </p:cxnSp>
+      <p:cxnSp>
+        <p:nvCxnSpPr>
+          <p:cNvPr id="22" name="Straight Arrow Connector 21">
+            <a:extLst>
+              <a:ext uri="{FF2B5EF4-FFF2-40B4-BE49-F238E27FC236}">
+                <a16:creationId xmlns:a16="http://schemas.microsoft.com/office/drawing/2014/main" id="{0C8C40BF-065E-564C-87AB-7A58FA6838B3}"/>
+              </a:ext>
+            </a:extLst>
+          </p:cNvPr>
+          <p:cNvCxnSpPr>
+            <a:cxnSpLocks/>
+            <a:stCxn id="17" idx="0"/>
+            <a:endCxn id="40" idx="5"/>
+          </p:cNvCxnSpPr>
+          <p:nvPr/>
+        </p:nvCxnSpPr>
+        <p:spPr>
+          <a:xfrm flipH="1" flipV="1">
+            <a:off x="4411339" y="707768"/>
+            <a:ext cx="61942" cy="1393583"/>
+          </a:xfrm>
+          <a:prstGeom prst="straightConnector1">
+            <a:avLst/>
+          </a:prstGeom>
+          <a:ln w="25400">
+            <a:solidFill>
+              <a:schemeClr val="tx1"/>
+            </a:solidFill>
+            <a:tailEnd type="triangle" w="lg" len="lg"/>
+          </a:ln>
+        </p:spPr>
+        <p:style>
+          <a:lnRef idx="1">
+            <a:schemeClr val="accent1"/>
+          </a:lnRef>
+          <a:fillRef idx="0">
+            <a:schemeClr val="accent1"/>
+          </a:fillRef>
+          <a:effectRef idx="0">
+            <a:schemeClr val="accent1"/>
+          </a:effectRef>
+          <a:fontRef idx="minor">
+            <a:schemeClr val="tx1"/>
+          </a:fontRef>
+        </p:style>
+      </p:cxnSp>
+      <p:cxnSp>
+        <p:nvCxnSpPr>
+          <p:cNvPr id="23" name="Straight Arrow Connector 22">
+            <a:extLst>
+              <a:ext uri="{FF2B5EF4-FFF2-40B4-BE49-F238E27FC236}">
+                <a16:creationId xmlns:a16="http://schemas.microsoft.com/office/drawing/2014/main" id="{680BFABB-1CA4-6F48-AB57-E0513638DACC}"/>
+              </a:ext>
+            </a:extLst>
+          </p:cNvPr>
+          <p:cNvCxnSpPr>
+            <a:cxnSpLocks/>
+            <a:stCxn id="14" idx="7"/>
+            <a:endCxn id="40" idx="3"/>
+          </p:cNvCxnSpPr>
+          <p:nvPr/>
+        </p:nvCxnSpPr>
+        <p:spPr>
+          <a:xfrm flipV="1">
+            <a:off x="3759297" y="707768"/>
+            <a:ext cx="231766" cy="557478"/>
+          </a:xfrm>
+          <a:prstGeom prst="straightConnector1">
+            <a:avLst/>
+          </a:prstGeom>
+          <a:ln w="25400">
+            <a:solidFill>
+              <a:schemeClr val="tx1"/>
+            </a:solidFill>
+            <a:tailEnd type="triangle" w="lg" len="lg"/>
+          </a:ln>
+        </p:spPr>
+        <p:style>
+          <a:lnRef idx="1">
+            <a:schemeClr val="accent1"/>
+          </a:lnRef>
+          <a:fillRef idx="0">
+            <a:schemeClr val="accent1"/>
+          </a:fillRef>
+          <a:effectRef idx="0">
+            <a:schemeClr val="accent1"/>
+          </a:effectRef>
+          <a:fontRef idx="minor">
+            <a:schemeClr val="tx1"/>
+          </a:fontRef>
+        </p:style>
+      </p:cxnSp>
+      <p:sp>
+        <p:nvSpPr>
+          <p:cNvPr id="24" name="TextBox 23">
+            <a:extLst>
+              <a:ext uri="{FF2B5EF4-FFF2-40B4-BE49-F238E27FC236}">
+                <a16:creationId xmlns:a16="http://schemas.microsoft.com/office/drawing/2014/main" id="{FCA3D7B6-8A08-5B47-B67B-DD93AAEA7DAC}"/>
+              </a:ext>
+            </a:extLst>
+          </p:cNvPr>
+          <p:cNvSpPr txBox="1"/>
+          <p:nvPr/>
+        </p:nvSpPr>
+        <p:spPr>
+          <a:xfrm>
+            <a:off x="1406945" y="1637348"/>
+            <a:ext cx="301686" cy="369332"/>
+          </a:xfrm>
+          <a:prstGeom prst="rect">
+            <a:avLst/>
+          </a:prstGeom>
+          <a:noFill/>
+        </p:spPr>
+        <p:txBody>
+          <a:bodyPr wrap="none" rtlCol="0">
+            <a:spAutoFit/>
+          </a:bodyPr>
+          <a:lstStyle/>
+          <a:p>
+            <a:r>
+              <a:rPr lang="en-US" dirty="0"/>
+              <a:t>5</a:t>
+            </a:r>
+          </a:p>
+        </p:txBody>
+      </p:sp>
+      <p:sp>
+        <p:nvSpPr>
+          <p:cNvPr id="25" name="TextBox 24">
+            <a:extLst>
+              <a:ext uri="{FF2B5EF4-FFF2-40B4-BE49-F238E27FC236}">
+                <a16:creationId xmlns:a16="http://schemas.microsoft.com/office/drawing/2014/main" id="{51EE56A5-B03F-1642-AD73-6F8F4F055F74}"/>
+              </a:ext>
+            </a:extLst>
+          </p:cNvPr>
+          <p:cNvSpPr txBox="1"/>
+          <p:nvPr/>
+        </p:nvSpPr>
+        <p:spPr>
+          <a:xfrm>
+            <a:off x="1901659" y="2616114"/>
+            <a:ext cx="301686" cy="369332"/>
+          </a:xfrm>
+          <a:prstGeom prst="rect">
+            <a:avLst/>
+          </a:prstGeom>
+          <a:noFill/>
+        </p:spPr>
+        <p:txBody>
+          <a:bodyPr wrap="none" rtlCol="0">
+            <a:spAutoFit/>
+          </a:bodyPr>
+          <a:lstStyle/>
+          <a:p>
+            <a:r>
+              <a:rPr lang="en-US" dirty="0"/>
+              <a:t>2</a:t>
+            </a:r>
+          </a:p>
+        </p:txBody>
+      </p:sp>
+      <p:sp>
+        <p:nvSpPr>
+          <p:cNvPr id="27" name="TextBox 26">
+            <a:extLst>
+              <a:ext uri="{FF2B5EF4-FFF2-40B4-BE49-F238E27FC236}">
+                <a16:creationId xmlns:a16="http://schemas.microsoft.com/office/drawing/2014/main" id="{6E0CDFCC-0C5B-6843-A252-A1C29830E4E2}"/>
+              </a:ext>
+            </a:extLst>
+          </p:cNvPr>
+          <p:cNvSpPr txBox="1"/>
+          <p:nvPr/>
+        </p:nvSpPr>
+        <p:spPr>
+          <a:xfrm>
+            <a:off x="3455875" y="2380411"/>
+            <a:ext cx="301686" cy="369332"/>
+          </a:xfrm>
+          <a:prstGeom prst="rect">
+            <a:avLst/>
+          </a:prstGeom>
+          <a:noFill/>
+        </p:spPr>
+        <p:txBody>
+          <a:bodyPr wrap="none" rtlCol="0">
+            <a:spAutoFit/>
+          </a:bodyPr>
+          <a:lstStyle/>
+          <a:p>
+            <a:r>
+              <a:rPr lang="en-US" dirty="0"/>
+              <a:t>1</a:t>
+            </a:r>
+          </a:p>
+        </p:txBody>
+      </p:sp>
+      <p:sp>
+        <p:nvSpPr>
+          <p:cNvPr id="28" name="TextBox 27">
+            <a:extLst>
+              <a:ext uri="{FF2B5EF4-FFF2-40B4-BE49-F238E27FC236}">
+                <a16:creationId xmlns:a16="http://schemas.microsoft.com/office/drawing/2014/main" id="{E5F80162-3C4B-5340-9EFD-23F583EC545A}"/>
+              </a:ext>
+            </a:extLst>
+          </p:cNvPr>
+          <p:cNvSpPr txBox="1"/>
+          <p:nvPr/>
+        </p:nvSpPr>
+        <p:spPr>
+          <a:xfrm>
+            <a:off x="2900036" y="1695943"/>
+            <a:ext cx="301686" cy="369332"/>
+          </a:xfrm>
+          <a:prstGeom prst="rect">
+            <a:avLst/>
+          </a:prstGeom>
+          <a:noFill/>
+        </p:spPr>
+        <p:txBody>
+          <a:bodyPr wrap="none" rtlCol="0">
+            <a:spAutoFit/>
+          </a:bodyPr>
+          <a:lstStyle/>
+          <a:p>
+            <a:r>
+              <a:rPr lang="en-US" dirty="0"/>
+              <a:t>2</a:t>
+            </a:r>
+          </a:p>
+        </p:txBody>
+      </p:sp>
+      <p:sp>
+        <p:nvSpPr>
+          <p:cNvPr id="30" name="TextBox 29">
+            <a:extLst>
+              <a:ext uri="{FF2B5EF4-FFF2-40B4-BE49-F238E27FC236}">
+                <a16:creationId xmlns:a16="http://schemas.microsoft.com/office/drawing/2014/main" id="{80F9A962-CA63-E84C-9CE5-EE86E0238DF4}"/>
+              </a:ext>
+            </a:extLst>
+          </p:cNvPr>
+          <p:cNvSpPr txBox="1"/>
+          <p:nvPr/>
+        </p:nvSpPr>
+        <p:spPr>
+          <a:xfrm>
+            <a:off x="4464853" y="1411353"/>
+            <a:ext cx="301686" cy="369332"/>
+          </a:xfrm>
+          <a:prstGeom prst="rect">
+            <a:avLst/>
+          </a:prstGeom>
+          <a:noFill/>
+        </p:spPr>
+        <p:txBody>
+          <a:bodyPr wrap="none" rtlCol="0">
+            <a:spAutoFit/>
+          </a:bodyPr>
+          <a:lstStyle/>
+          <a:p>
+            <a:r>
+              <a:rPr lang="en-US" dirty="0"/>
+              <a:t>5</a:t>
+            </a:r>
+          </a:p>
+        </p:txBody>
+      </p:sp>
+      <p:sp>
+        <p:nvSpPr>
+          <p:cNvPr id="40" name="Oval 39">
+            <a:extLst>
+              <a:ext uri="{FF2B5EF4-FFF2-40B4-BE49-F238E27FC236}">
+                <a16:creationId xmlns:a16="http://schemas.microsoft.com/office/drawing/2014/main" id="{D5CC3453-0413-C946-8FD3-39F11778B2A8}"/>
+              </a:ext>
+            </a:extLst>
+          </p:cNvPr>
+          <p:cNvSpPr>
+            <a:spLocks noChangeAspect="1"/>
+          </p:cNvSpPr>
+          <p:nvPr/>
+        </p:nvSpPr>
+        <p:spPr>
+          <a:xfrm>
+            <a:off x="3904021" y="200450"/>
+            <a:ext cx="594360" cy="594360"/>
+          </a:xfrm>
+          <a:prstGeom prst="ellipse">
+            <a:avLst/>
+          </a:prstGeom>
+          <a:noFill/>
+          <a:ln>
+            <a:solidFill>
+              <a:schemeClr val="tx1"/>
+            </a:solidFill>
+          </a:ln>
+        </p:spPr>
+        <p:style>
+          <a:lnRef idx="2">
+            <a:schemeClr val="accent1">
+              <a:shade val="50000"/>
+            </a:schemeClr>
+          </a:lnRef>
+          <a:fillRef idx="1">
+            <a:schemeClr val="accent1"/>
+          </a:fillRef>
+          <a:effectRef idx="0">
+            <a:schemeClr val="accent1"/>
+          </a:effectRef>
+          <a:fontRef idx="minor">
+            <a:schemeClr val="lt1"/>
+          </a:fontRef>
+        </p:style>
+        <p:txBody>
+          <a:bodyPr rtlCol="0" anchor="ctr"/>
+          <a:lstStyle/>
+          <a:p>
+            <a:pPr algn="ctr"/>
+            <a:endParaRPr lang="en-US"/>
+          </a:p>
+        </p:txBody>
+      </p:sp>
+      <p:sp>
+        <p:nvSpPr>
+          <p:cNvPr id="41" name="TextBox 40">
+            <a:extLst>
+              <a:ext uri="{FF2B5EF4-FFF2-40B4-BE49-F238E27FC236}">
+                <a16:creationId xmlns:a16="http://schemas.microsoft.com/office/drawing/2014/main" id="{F97F1AB9-5154-4342-ADAC-5A377B288D05}"/>
+              </a:ext>
+            </a:extLst>
+          </p:cNvPr>
+          <p:cNvSpPr txBox="1"/>
+          <p:nvPr/>
+        </p:nvSpPr>
+        <p:spPr>
+          <a:xfrm>
+            <a:off x="3258629" y="1201611"/>
+            <a:ext cx="542136" cy="584775"/>
+          </a:xfrm>
+          <a:prstGeom prst="rect">
+            <a:avLst/>
+          </a:prstGeom>
+          <a:noFill/>
+        </p:spPr>
+        <p:txBody>
+          <a:bodyPr wrap="none" rtlCol="0">
+            <a:spAutoFit/>
+          </a:bodyPr>
+          <a:lstStyle/>
+          <a:p>
+            <a:pPr algn="ctr"/>
+            <a:r>
+              <a:rPr lang="en-US" b="1" dirty="0"/>
+              <a:t>C</a:t>
+            </a:r>
+          </a:p>
+          <a:p>
+            <a:pPr algn="ctr"/>
+            <a:r>
+              <a:rPr lang="en-US" sz="1400" b="1" dirty="0"/>
+              <a:t>h = 2</a:t>
+            </a:r>
+          </a:p>
+        </p:txBody>
+      </p:sp>
+      <p:cxnSp>
+        <p:nvCxnSpPr>
+          <p:cNvPr id="42" name="Straight Arrow Connector 41">
+            <a:extLst>
+              <a:ext uri="{FF2B5EF4-FFF2-40B4-BE49-F238E27FC236}">
+                <a16:creationId xmlns:a16="http://schemas.microsoft.com/office/drawing/2014/main" id="{5970423D-672F-E04F-919F-32D04A418B4A}"/>
+              </a:ext>
+            </a:extLst>
+          </p:cNvPr>
+          <p:cNvCxnSpPr>
+            <a:cxnSpLocks/>
+            <a:stCxn id="7" idx="7"/>
+            <a:endCxn id="40" idx="2"/>
+          </p:cNvCxnSpPr>
+          <p:nvPr/>
+        </p:nvCxnSpPr>
+        <p:spPr>
+          <a:xfrm flipV="1">
+            <a:off x="2477284" y="497630"/>
+            <a:ext cx="1426737" cy="240235"/>
+          </a:xfrm>
+          <a:prstGeom prst="straightConnector1">
+            <a:avLst/>
+          </a:prstGeom>
+          <a:ln w="25400">
+            <a:solidFill>
+              <a:schemeClr val="tx1"/>
+            </a:solidFill>
+            <a:tailEnd type="triangle" w="lg" len="lg"/>
+          </a:ln>
+        </p:spPr>
+        <p:style>
+          <a:lnRef idx="1">
+            <a:schemeClr val="accent1"/>
+          </a:lnRef>
+          <a:fillRef idx="0">
+            <a:schemeClr val="accent1"/>
+          </a:fillRef>
+          <a:effectRef idx="0">
+            <a:schemeClr val="accent1"/>
+          </a:effectRef>
+          <a:fontRef idx="minor">
+            <a:schemeClr val="tx1"/>
+          </a:fontRef>
+        </p:style>
+      </p:cxnSp>
+      <p:sp>
+        <p:nvSpPr>
+          <p:cNvPr id="47" name="TextBox 46">
+            <a:extLst>
+              <a:ext uri="{FF2B5EF4-FFF2-40B4-BE49-F238E27FC236}">
+                <a16:creationId xmlns:a16="http://schemas.microsoft.com/office/drawing/2014/main" id="{D1D5A78F-472E-8449-BF9A-F4A2463EAD65}"/>
+              </a:ext>
+            </a:extLst>
+          </p:cNvPr>
+          <p:cNvSpPr txBox="1"/>
+          <p:nvPr/>
+        </p:nvSpPr>
+        <p:spPr>
+          <a:xfrm>
+            <a:off x="2835156" y="332457"/>
+            <a:ext cx="301686" cy="369332"/>
+          </a:xfrm>
+          <a:prstGeom prst="rect">
+            <a:avLst/>
+          </a:prstGeom>
+          <a:noFill/>
+        </p:spPr>
+        <p:txBody>
+          <a:bodyPr wrap="none" rtlCol="0">
+            <a:spAutoFit/>
+          </a:bodyPr>
+          <a:lstStyle/>
+          <a:p>
+            <a:r>
+              <a:rPr lang="en-US" dirty="0"/>
+              <a:t>5</a:t>
+            </a:r>
+          </a:p>
+        </p:txBody>
+      </p:sp>
+      <p:sp>
+        <p:nvSpPr>
+          <p:cNvPr id="48" name="TextBox 47">
+            <a:extLst>
+              <a:ext uri="{FF2B5EF4-FFF2-40B4-BE49-F238E27FC236}">
+                <a16:creationId xmlns:a16="http://schemas.microsoft.com/office/drawing/2014/main" id="{C5BD3056-9625-F347-9CF9-CD473F8AE9AA}"/>
+              </a:ext>
+            </a:extLst>
+          </p:cNvPr>
+          <p:cNvSpPr txBox="1"/>
+          <p:nvPr/>
+        </p:nvSpPr>
+        <p:spPr>
+          <a:xfrm>
+            <a:off x="3578212" y="814561"/>
+            <a:ext cx="301686" cy="369332"/>
+          </a:xfrm>
+          <a:prstGeom prst="rect">
+            <a:avLst/>
+          </a:prstGeom>
+          <a:noFill/>
+        </p:spPr>
+        <p:txBody>
+          <a:bodyPr wrap="none" rtlCol="0">
+            <a:spAutoFit/>
+          </a:bodyPr>
+          <a:lstStyle/>
+          <a:p>
+            <a:r>
+              <a:rPr lang="en-US" dirty="0"/>
+              <a:t>2</a:t>
+            </a:r>
+          </a:p>
+        </p:txBody>
+      </p:sp>
+      <p:sp>
+        <p:nvSpPr>
+          <p:cNvPr id="49" name="AutoShape 2" descr="LaTeX: MN">
+            <a:extLst>
+              <a:ext uri="{FF2B5EF4-FFF2-40B4-BE49-F238E27FC236}">
+                <a16:creationId xmlns:a16="http://schemas.microsoft.com/office/drawing/2014/main" id="{B44133E8-DD51-A04B-A19B-EC54D9596996}"/>
+              </a:ext>
+            </a:extLst>
+          </p:cNvPr>
+          <p:cNvSpPr>
+            <a:spLocks noChangeAspect="1" noChangeArrowheads="1"/>
+          </p:cNvSpPr>
+          <p:nvPr/>
+        </p:nvSpPr>
+        <p:spPr bwMode="auto">
+          <a:xfrm>
+            <a:off x="5943600" y="3276600"/>
+            <a:ext cx="304800" cy="304800"/>
+          </a:xfrm>
+          <a:prstGeom prst="rect">
+            <a:avLst/>
+          </a:prstGeom>
+          <a:noFill/>
+          <a:extLst>
+            <a:ext uri="{909E8E84-426E-40DD-AFC4-6F175D3DCCD1}">
+              <a14:hiddenFill xmlns:a14="http://schemas.microsoft.com/office/drawing/2010/main">
+                <a:solidFill>
+                  <a:srgbClr val="FFFFFF"/>
+                </a:solidFill>
+              </a14:hiddenFill>
+            </a:ext>
+          </a:extLst>
+        </p:spPr>
+        <p:txBody>
+          <a:bodyPr vert="horz" wrap="square" lIns="91440" tIns="45720" rIns="91440" bIns="45720" numCol="1" anchor="t" anchorCtr="0" compatLnSpc="1">
+            <a:prstTxWarp prst="textNoShape">
+              <a:avLst/>
+            </a:prstTxWarp>
+          </a:bodyPr>
+          <a:lstStyle/>
+          <a:p>
+            <a:endParaRPr lang="en-US"/>
+          </a:p>
+        </p:txBody>
+      </p:sp>
+      <p:sp>
+        <p:nvSpPr>
+          <p:cNvPr id="78" name="TextBox 77">
+            <a:extLst>
+              <a:ext uri="{FF2B5EF4-FFF2-40B4-BE49-F238E27FC236}">
+                <a16:creationId xmlns:a16="http://schemas.microsoft.com/office/drawing/2014/main" id="{DEE1F0D8-CBCA-1D4A-960B-F58CF1C491A2}"/>
+              </a:ext>
+            </a:extLst>
+          </p:cNvPr>
+          <p:cNvSpPr txBox="1"/>
+          <p:nvPr/>
+        </p:nvSpPr>
+        <p:spPr>
+          <a:xfrm>
+            <a:off x="4051594" y="312964"/>
+            <a:ext cx="330540" cy="369332"/>
+          </a:xfrm>
+          <a:prstGeom prst="rect">
+            <a:avLst/>
+          </a:prstGeom>
+          <a:noFill/>
+        </p:spPr>
+        <p:txBody>
+          <a:bodyPr wrap="none" rtlCol="0">
+            <a:spAutoFit/>
+          </a:bodyPr>
+          <a:lstStyle/>
+          <a:p>
+            <a:pPr algn="ctr"/>
+            <a:r>
+              <a:rPr lang="en-US" b="1" dirty="0"/>
+              <a:t>G</a:t>
+            </a:r>
+          </a:p>
+        </p:txBody>
+      </p:sp>
+    </p:spTree>
+    <p:extLst>
+      <p:ext uri="{BB962C8B-B14F-4D97-AF65-F5344CB8AC3E}">
+        <p14:creationId xmlns:p14="http://schemas.microsoft.com/office/powerpoint/2010/main" val="2635001220"/>
+      </p:ext>
+    </p:extLst>
+  </p:cSld>
+  <p:clrMapOvr>
+    <a:masterClrMapping/>
+  </p:clrMapOvr>
+</p:sld>
+</file>
+
+<file path=ppt/slides/slide5.xml><?xml version="1.0" encoding="utf-8"?>
+<p:sld xmlns:a="http://schemas.openxmlformats.org/drawingml/2006/main" xmlns:r="http://schemas.openxmlformats.org/officeDocument/2006/relationships" xmlns:p="http://schemas.openxmlformats.org/presentationml/2006/main">
+  <p:cSld>
+    <p:spTree>
+      <p:nvGrpSpPr>
+        <p:cNvPr id="1" name=""/>
+        <p:cNvGrpSpPr/>
+        <p:nvPr/>
+      </p:nvGrpSpPr>
+      <p:grpSpPr>
+        <a:xfrm>
+          <a:off x="0" y="0"/>
+          <a:ext cx="0" cy="0"/>
+          <a:chOff x="0" y="0"/>
+          <a:chExt cx="0" cy="0"/>
+        </a:xfrm>
+      </p:grpSpPr>
+      <p:graphicFrame>
+        <p:nvGraphicFramePr>
+          <p:cNvPr id="2" name="Table 2">
+            <a:extLst>
+              <a:ext uri="{FF2B5EF4-FFF2-40B4-BE49-F238E27FC236}">
+                <a16:creationId xmlns:a16="http://schemas.microsoft.com/office/drawing/2014/main" id="{5F2CBA84-577F-724B-93B7-F93EE1F9AF4E}"/>
+              </a:ext>
+            </a:extLst>
+          </p:cNvPr>
+          <p:cNvGraphicFramePr>
+            <a:graphicFrameLocks noGrp="1"/>
+          </p:cNvGraphicFramePr>
+          <p:nvPr>
+            <p:extLst>
+              <p:ext uri="{D42A27DB-BD31-4B8C-83A1-F6EECF244321}">
+                <p14:modId xmlns:p14="http://schemas.microsoft.com/office/powerpoint/2010/main" val="3292552245"/>
+              </p:ext>
+            </p:extLst>
+          </p:nvPr>
+        </p:nvGraphicFramePr>
+        <p:xfrm>
+          <a:off x="1916814" y="728718"/>
+          <a:ext cx="8358372" cy="4407140"/>
+        </p:xfrm>
+        <a:graphic>
+          <a:graphicData uri="http://schemas.openxmlformats.org/drawingml/2006/table">
+            <a:tbl>
+              <a:tblPr firstRow="1" bandRow="1">
+                <a:tableStyleId>{5C22544A-7EE6-4342-B048-85BDC9FD1C3A}</a:tableStyleId>
+              </a:tblPr>
+              <a:tblGrid>
+                <a:gridCol w="928708">
+                  <a:extLst>
+                    <a:ext uri="{9D8B030D-6E8A-4147-A177-3AD203B41FA5}">
+                      <a16:colId xmlns:a16="http://schemas.microsoft.com/office/drawing/2014/main" val="878417993"/>
+                    </a:ext>
+                  </a:extLst>
+                </a:gridCol>
+                <a:gridCol w="928708">
+                  <a:extLst>
+                    <a:ext uri="{9D8B030D-6E8A-4147-A177-3AD203B41FA5}">
+                      <a16:colId xmlns:a16="http://schemas.microsoft.com/office/drawing/2014/main" val="2056876756"/>
+                    </a:ext>
+                  </a:extLst>
+                </a:gridCol>
+                <a:gridCol w="928708">
+                  <a:extLst>
+                    <a:ext uri="{9D8B030D-6E8A-4147-A177-3AD203B41FA5}">
+                      <a16:colId xmlns:a16="http://schemas.microsoft.com/office/drawing/2014/main" val="3808415992"/>
+                    </a:ext>
+                  </a:extLst>
+                </a:gridCol>
+                <a:gridCol w="928708">
+                  <a:extLst>
+                    <a:ext uri="{9D8B030D-6E8A-4147-A177-3AD203B41FA5}">
+                      <a16:colId xmlns:a16="http://schemas.microsoft.com/office/drawing/2014/main" val="3614404612"/>
+                    </a:ext>
+                  </a:extLst>
+                </a:gridCol>
+                <a:gridCol w="928708">
+                  <a:extLst>
+                    <a:ext uri="{9D8B030D-6E8A-4147-A177-3AD203B41FA5}">
+                      <a16:colId xmlns:a16="http://schemas.microsoft.com/office/drawing/2014/main" val="441397989"/>
+                    </a:ext>
+                  </a:extLst>
+                </a:gridCol>
+                <a:gridCol w="928708">
+                  <a:extLst>
+                    <a:ext uri="{9D8B030D-6E8A-4147-A177-3AD203B41FA5}">
+                      <a16:colId xmlns:a16="http://schemas.microsoft.com/office/drawing/2014/main" val="240386216"/>
+                    </a:ext>
+                  </a:extLst>
+                </a:gridCol>
+                <a:gridCol w="928708">
+                  <a:extLst>
+                    <a:ext uri="{9D8B030D-6E8A-4147-A177-3AD203B41FA5}">
+                      <a16:colId xmlns:a16="http://schemas.microsoft.com/office/drawing/2014/main" val="1214099862"/>
+                    </a:ext>
+                  </a:extLst>
+                </a:gridCol>
+                <a:gridCol w="928708">
+                  <a:extLst>
+                    <a:ext uri="{9D8B030D-6E8A-4147-A177-3AD203B41FA5}">
+                      <a16:colId xmlns:a16="http://schemas.microsoft.com/office/drawing/2014/main" val="2265785134"/>
+                    </a:ext>
+                  </a:extLst>
+                </a:gridCol>
+                <a:gridCol w="928708">
+                  <a:extLst>
+                    <a:ext uri="{9D8B030D-6E8A-4147-A177-3AD203B41FA5}">
+                      <a16:colId xmlns:a16="http://schemas.microsoft.com/office/drawing/2014/main" val="2038284966"/>
+                    </a:ext>
+                  </a:extLst>
+                </a:gridCol>
+              </a:tblGrid>
+              <a:tr h="881428">
+                <a:tc gridSpan="9">
+                  <a:txBody>
+                    <a:bodyPr/>
+                    <a:lstStyle/>
+                    <a:p>
+                      <a:endParaRPr lang="en-US" dirty="0"/>
+                    </a:p>
+                  </a:txBody>
+                  <a:tcPr>
+                    <a:lnL w="12700" cmpd="sng">
+                      <a:noFill/>
+                    </a:lnL>
+                    <a:lnR w="12700" cmpd="sng">
+                      <a:noFill/>
+                    </a:lnR>
+                    <a:lnT w="12700" cmpd="sng">
+                      <a:noFill/>
+                    </a:lnT>
+                    <a:lnB w="12700" cap="flat" cmpd="sng" algn="ctr">
+                      <a:solidFill>
+                        <a:schemeClr val="tx1"/>
+                      </a:solidFill>
+                      <a:prstDash val="solid"/>
+                      <a:round/>
+                      <a:headEnd type="none" w="med" len="med"/>
+                      <a:tailEnd type="none" w="med" len="med"/>
+                    </a:lnB>
+                    <a:lnTlToBr w="12700" cmpd="sng">
+                      <a:noFill/>
+                      <a:prstDash val="solid"/>
+                    </a:lnTlToBr>
+                    <a:lnBlToTr w="12700" cmpd="sng">
+                      <a:noFill/>
+                      <a:prstDash val="solid"/>
+                    </a:lnBlToTr>
+                    <a:solidFill>
+                      <a:schemeClr val="tx1"/>
+                    </a:solidFill>
+                  </a:tcPr>
+                </a:tc>
+                <a:tc hMerge="1">
+                  <a:txBody>
+                    <a:bodyPr/>
+                    <a:lstStyle/>
+                    <a:p>
+                      <a:endParaRPr lang="en-US" dirty="0"/>
+                    </a:p>
+                  </a:txBody>
+                  <a:tcPr>
+                    <a:solidFill>
+                      <a:schemeClr val="tx1"/>
+                    </a:solidFill>
+                  </a:tcPr>
+                </a:tc>
+                <a:tc hMerge="1">
+                  <a:txBody>
+                    <a:bodyPr/>
+                    <a:lstStyle/>
+                    <a:p>
+                      <a:endParaRPr lang="en-US" dirty="0"/>
+                    </a:p>
+                  </a:txBody>
+                  <a:tcPr>
+                    <a:lnL w="12700" cmpd="sng">
+                      <a:noFill/>
+                    </a:lnL>
+                    <a:solidFill>
+                      <a:schemeClr val="tx1"/>
+                    </a:solidFill>
+                  </a:tcPr>
+                </a:tc>
+                <a:tc hMerge="1">
+                  <a:txBody>
+                    <a:bodyPr/>
+                    <a:lstStyle/>
+                    <a:p>
+                      <a:endParaRPr lang="en-US" dirty="0"/>
+                    </a:p>
+                  </a:txBody>
+                  <a:tcPr>
+                    <a:lnL w="12700" cmpd="sng">
+                      <a:noFill/>
+                    </a:lnL>
+                    <a:solidFill>
+                      <a:schemeClr val="tx1"/>
+                    </a:solidFill>
+                  </a:tcPr>
+                </a:tc>
+                <a:tc hMerge="1">
+                  <a:txBody>
+                    <a:bodyPr/>
+                    <a:lstStyle/>
+                    <a:p>
+                      <a:endParaRPr lang="en-US" dirty="0"/>
+                    </a:p>
+                  </a:txBody>
+                  <a:tcPr>
+                    <a:lnL w="12700" cmpd="sng">
+                      <a:noFill/>
+                    </a:lnL>
+                    <a:solidFill>
+                      <a:schemeClr val="tx1"/>
+                    </a:solidFill>
+                  </a:tcPr>
+                </a:tc>
+                <a:tc hMerge="1">
+                  <a:txBody>
+                    <a:bodyPr/>
+                    <a:lstStyle/>
+                    <a:p>
+                      <a:endParaRPr lang="en-US" dirty="0"/>
+                    </a:p>
+                  </a:txBody>
+                  <a:tcPr>
+                    <a:lnL w="12700" cmpd="sng">
+                      <a:noFill/>
+                    </a:lnL>
+                    <a:solidFill>
+                      <a:schemeClr val="tx1"/>
+                    </a:solidFill>
+                  </a:tcPr>
+                </a:tc>
+                <a:tc hMerge="1">
+                  <a:txBody>
+                    <a:bodyPr/>
+                    <a:lstStyle/>
+                    <a:p>
+                      <a:endParaRPr lang="en-US" dirty="0"/>
+                    </a:p>
+                  </a:txBody>
+                  <a:tcPr>
+                    <a:solidFill>
+                      <a:schemeClr val="tx1"/>
+                    </a:solidFill>
+                  </a:tcPr>
+                </a:tc>
+                <a:tc hMerge="1">
+                  <a:txBody>
+                    <a:bodyPr/>
+                    <a:lstStyle/>
+                    <a:p>
+                      <a:endParaRPr lang="en-US" dirty="0"/>
+                    </a:p>
+                  </a:txBody>
+                  <a:tcPr>
+                    <a:solidFill>
+                      <a:schemeClr val="tx1"/>
+                    </a:solidFill>
+                  </a:tcPr>
+                </a:tc>
+                <a:tc hMerge="1">
+                  <a:txBody>
+                    <a:bodyPr/>
+                    <a:lstStyle/>
+                    <a:p>
+                      <a:endParaRPr lang="en-US" dirty="0"/>
+                    </a:p>
+                  </a:txBody>
+                  <a:tcPr>
+                    <a:solidFill>
+                      <a:schemeClr val="tx1"/>
+                    </a:solidFill>
+                  </a:tcPr>
+                </a:tc>
+                <a:extLst>
+                  <a:ext uri="{0D108BD9-81ED-4DB2-BD59-A6C34878D82A}">
+                    <a16:rowId xmlns:a16="http://schemas.microsoft.com/office/drawing/2014/main" val="1587327936"/>
+                  </a:ext>
+                </a:extLst>
+              </a:tr>
+              <a:tr h="881428">
+                <a:tc>
+                  <a:txBody>
+                    <a:bodyPr/>
+                    <a:lstStyle/>
+                    <a:p>
+                      <a:endParaRPr lang="en-US" dirty="0"/>
+                    </a:p>
+                  </a:txBody>
+                  <a:tcPr>
+                    <a:lnL w="12700" cap="flat" cmpd="sng" algn="ctr">
+                      <a:solidFill>
+                        <a:schemeClr val="tx1"/>
+                      </a:solidFill>
+                      <a:prstDash val="solid"/>
+                      <a:round/>
+                      <a:headEnd type="none" w="med" len="med"/>
+                      <a:tailEnd type="none" w="med" len="med"/>
+                    </a:lnL>
+                    <a:lnR w="12700" cap="flat" cmpd="sng" algn="ctr">
+                      <a:solidFill>
+                        <a:schemeClr val="tx1"/>
+                      </a:solidFill>
+                      <a:prstDash val="solid"/>
+                      <a:round/>
+                      <a:headEnd type="none" w="med" len="med"/>
+                      <a:tailEnd type="none" w="med" len="med"/>
+                    </a:lnR>
+                    <a:lnT w="12700" cap="flat" cmpd="sng" algn="ctr">
+                      <a:solidFill>
+                        <a:schemeClr val="tx1"/>
+                      </a:solidFill>
+                      <a:prstDash val="solid"/>
+                      <a:round/>
+                      <a:headEnd type="none" w="med" len="med"/>
+                      <a:tailEnd type="none" w="med" len="med"/>
+                    </a:lnT>
+                    <a:lnB w="12700" cap="flat" cmpd="sng" algn="ctr">
+                      <a:solidFill>
+                        <a:schemeClr val="tx1"/>
+                      </a:solidFill>
+                      <a:prstDash val="solid"/>
+                      <a:round/>
+                      <a:headEnd type="none" w="med" len="med"/>
+                      <a:tailEnd type="none" w="med" len="med"/>
+                    </a:lnB>
+                    <a:noFill/>
+                  </a:tcPr>
+                </a:tc>
+                <a:tc>
+                  <a:txBody>
+                    <a:bodyPr/>
+                    <a:lstStyle/>
+                    <a:p>
+                      <a:endParaRPr lang="en-US" dirty="0"/>
+                    </a:p>
+                  </a:txBody>
+                  <a:tcPr>
+                    <a:lnL w="12700" cap="flat" cmpd="sng" algn="ctr">
+                      <a:solidFill>
+                        <a:schemeClr val="tx1"/>
+                      </a:solidFill>
+                      <a:prstDash val="solid"/>
+                      <a:round/>
+                      <a:headEnd type="none" w="med" len="med"/>
+                      <a:tailEnd type="none" w="med" len="med"/>
+                    </a:lnL>
+                    <a:lnR w="12700" cap="flat" cmpd="sng" algn="ctr">
+                      <a:solidFill>
+                        <a:schemeClr val="tx1"/>
+                      </a:solidFill>
+                      <a:prstDash val="solid"/>
+                      <a:round/>
+                      <a:headEnd type="none" w="med" len="med"/>
+                      <a:tailEnd type="none" w="med" len="med"/>
+                    </a:lnR>
+                    <a:lnT w="12700" cap="flat" cmpd="sng" algn="ctr">
+                      <a:solidFill>
+                        <a:schemeClr val="tx1"/>
+                      </a:solidFill>
+                      <a:prstDash val="solid"/>
+                      <a:round/>
+                      <a:headEnd type="none" w="med" len="med"/>
+                      <a:tailEnd type="none" w="med" len="med"/>
+                    </a:lnT>
+                    <a:lnB w="12700" cap="flat" cmpd="sng" algn="ctr">
+                      <a:solidFill>
+                        <a:schemeClr val="tx1"/>
+                      </a:solidFill>
+                      <a:prstDash val="solid"/>
+                      <a:round/>
+                      <a:headEnd type="none" w="med" len="med"/>
+                      <a:tailEnd type="none" w="med" len="med"/>
+                    </a:lnB>
+                    <a:noFill/>
+                  </a:tcPr>
+                </a:tc>
+                <a:tc>
+                  <a:txBody>
+                    <a:bodyPr/>
+                    <a:lstStyle/>
+                    <a:p>
+                      <a:endParaRPr lang="en-US" dirty="0"/>
+                    </a:p>
+                  </a:txBody>
+                  <a:tcPr>
+                    <a:lnL w="12700" cap="flat" cmpd="sng" algn="ctr">
+                      <a:solidFill>
+                        <a:schemeClr val="tx1"/>
+                      </a:solidFill>
+                      <a:prstDash val="solid"/>
+                      <a:round/>
+                      <a:headEnd type="none" w="med" len="med"/>
+                      <a:tailEnd type="none" w="med" len="med"/>
+                    </a:lnL>
+                    <a:lnR w="12700" cap="flat" cmpd="sng" algn="ctr">
+                      <a:solidFill>
+                        <a:schemeClr val="tx1"/>
+                      </a:solidFill>
+                      <a:prstDash val="solid"/>
+                      <a:round/>
+                      <a:headEnd type="none" w="med" len="med"/>
+                      <a:tailEnd type="none" w="med" len="med"/>
+                    </a:lnR>
+                    <a:lnT w="12700" cap="flat" cmpd="sng" algn="ctr">
+                      <a:solidFill>
+                        <a:schemeClr val="tx1"/>
+                      </a:solidFill>
+                      <a:prstDash val="solid"/>
+                      <a:round/>
+                      <a:headEnd type="none" w="med" len="med"/>
+                      <a:tailEnd type="none" w="med" len="med"/>
+                    </a:lnT>
+                    <a:lnB w="12700" cap="flat" cmpd="sng" algn="ctr">
+                      <a:solidFill>
+                        <a:schemeClr val="tx1"/>
+                      </a:solidFill>
+                      <a:prstDash val="solid"/>
+                      <a:round/>
+                      <a:headEnd type="none" w="med" len="med"/>
+                      <a:tailEnd type="none" w="med" len="med"/>
+                    </a:lnB>
+                    <a:noFill/>
+                  </a:tcPr>
+                </a:tc>
+                <a:tc>
+                  <a:txBody>
+                    <a:bodyPr/>
+                    <a:lstStyle/>
+                    <a:p>
+                      <a:endParaRPr lang="en-US" dirty="0"/>
+                    </a:p>
+                  </a:txBody>
+                  <a:tcPr>
+                    <a:lnL w="12700" cap="flat" cmpd="sng" algn="ctr">
+                      <a:solidFill>
+                        <a:schemeClr val="tx1"/>
+                      </a:solidFill>
+                      <a:prstDash val="solid"/>
+                      <a:round/>
+                      <a:headEnd type="none" w="med" len="med"/>
+                      <a:tailEnd type="none" w="med" len="med"/>
+                    </a:lnL>
+                    <a:lnR w="12700" cap="flat" cmpd="sng" algn="ctr">
+                      <a:solidFill>
+                        <a:schemeClr val="tx1"/>
+                      </a:solidFill>
+                      <a:prstDash val="solid"/>
+                      <a:round/>
+                      <a:headEnd type="none" w="med" len="med"/>
+                      <a:tailEnd type="none" w="med" len="med"/>
+                    </a:lnR>
+                    <a:lnT w="12700" cap="flat" cmpd="sng" algn="ctr">
+                      <a:solidFill>
+                        <a:schemeClr val="tx1"/>
+                      </a:solidFill>
+                      <a:prstDash val="solid"/>
+                      <a:round/>
+                      <a:headEnd type="none" w="med" len="med"/>
+                      <a:tailEnd type="none" w="med" len="med"/>
+                    </a:lnT>
+                    <a:lnB w="12700" cap="flat" cmpd="sng" algn="ctr">
+                      <a:solidFill>
+                        <a:schemeClr val="tx1"/>
+                      </a:solidFill>
+                      <a:prstDash val="solid"/>
+                      <a:round/>
+                      <a:headEnd type="none" w="med" len="med"/>
+                      <a:tailEnd type="none" w="med" len="med"/>
+                    </a:lnB>
+                    <a:noFill/>
+                  </a:tcPr>
+                </a:tc>
+                <a:tc>
+                  <a:txBody>
+                    <a:bodyPr/>
+                    <a:lstStyle/>
+                    <a:p>
+                      <a:endParaRPr lang="en-US" dirty="0"/>
+                    </a:p>
+                  </a:txBody>
+                  <a:tcPr>
+                    <a:lnL w="12700" cap="flat" cmpd="sng" algn="ctr">
+                      <a:solidFill>
+                        <a:schemeClr val="tx1"/>
+                      </a:solidFill>
+                      <a:prstDash val="solid"/>
+                      <a:round/>
+                      <a:headEnd type="none" w="med" len="med"/>
+                      <a:tailEnd type="none" w="med" len="med"/>
+                    </a:lnL>
+                    <a:lnR w="12700" cap="flat" cmpd="sng" algn="ctr">
+                      <a:solidFill>
+                        <a:schemeClr val="tx1"/>
+                      </a:solidFill>
+                      <a:prstDash val="solid"/>
+                      <a:round/>
+                      <a:headEnd type="none" w="med" len="med"/>
+                      <a:tailEnd type="none" w="med" len="med"/>
+                    </a:lnR>
+                    <a:lnT w="12700" cap="flat" cmpd="sng" algn="ctr">
+                      <a:solidFill>
+                        <a:schemeClr val="tx1"/>
+                      </a:solidFill>
+                      <a:prstDash val="solid"/>
+                      <a:round/>
+                      <a:headEnd type="none" w="med" len="med"/>
+                      <a:tailEnd type="none" w="med" len="med"/>
+                    </a:lnT>
+                    <a:lnB w="12700" cap="flat" cmpd="sng" algn="ctr">
+                      <a:solidFill>
+                        <a:schemeClr val="tx1"/>
+                      </a:solidFill>
+                      <a:prstDash val="solid"/>
+                      <a:round/>
+                      <a:headEnd type="none" w="med" len="med"/>
+                      <a:tailEnd type="none" w="med" len="med"/>
+                    </a:lnB>
+                    <a:noFill/>
+                  </a:tcPr>
+                </a:tc>
+                <a:tc>
+                  <a:txBody>
+                    <a:bodyPr/>
+                    <a:lstStyle/>
+                    <a:p>
+                      <a:endParaRPr lang="en-US" dirty="0"/>
+                    </a:p>
+                  </a:txBody>
+                  <a:tcPr>
+                    <a:lnL w="12700" cap="flat" cmpd="sng" algn="ctr">
+                      <a:solidFill>
+                        <a:schemeClr val="tx1"/>
+                      </a:solidFill>
+                      <a:prstDash val="solid"/>
+                      <a:round/>
+                      <a:headEnd type="none" w="med" len="med"/>
+                      <a:tailEnd type="none" w="med" len="med"/>
+                    </a:lnL>
+                    <a:lnR w="12700" cap="flat" cmpd="sng" algn="ctr">
+                      <a:solidFill>
+                        <a:schemeClr val="tx1"/>
+                      </a:solidFill>
+                      <a:prstDash val="solid"/>
+                      <a:round/>
+                      <a:headEnd type="none" w="med" len="med"/>
+                      <a:tailEnd type="none" w="med" len="med"/>
+                    </a:lnR>
+                    <a:lnT w="12700" cap="flat" cmpd="sng" algn="ctr">
+                      <a:solidFill>
+                        <a:schemeClr val="tx1"/>
+                      </a:solidFill>
+                      <a:prstDash val="solid"/>
+                      <a:round/>
+                      <a:headEnd type="none" w="med" len="med"/>
+                      <a:tailEnd type="none" w="med" len="med"/>
+                    </a:lnT>
+                    <a:lnB w="12700" cap="flat" cmpd="sng" algn="ctr">
+                      <a:solidFill>
+                        <a:schemeClr val="tx1"/>
+                      </a:solidFill>
+                      <a:prstDash val="solid"/>
+                      <a:round/>
+                      <a:headEnd type="none" w="med" len="med"/>
+                      <a:tailEnd type="none" w="med" len="med"/>
+                    </a:lnB>
+                    <a:noFill/>
+                  </a:tcPr>
+                </a:tc>
+                <a:tc>
+                  <a:txBody>
+                    <a:bodyPr/>
+                    <a:lstStyle/>
+                    <a:p>
+                      <a:endParaRPr lang="en-US" dirty="0"/>
+                    </a:p>
+                  </a:txBody>
+                  <a:tcPr>
+                    <a:lnL w="12700" cap="flat" cmpd="sng" algn="ctr">
+                      <a:solidFill>
+                        <a:schemeClr val="tx1"/>
+                      </a:solidFill>
+                      <a:prstDash val="solid"/>
+                      <a:round/>
+                      <a:headEnd type="none" w="med" len="med"/>
+                      <a:tailEnd type="none" w="med" len="med"/>
+                    </a:lnL>
+                    <a:lnR w="12700" cap="flat" cmpd="sng" algn="ctr">
+                      <a:solidFill>
+                        <a:schemeClr val="tx1"/>
+                      </a:solidFill>
+                      <a:prstDash val="solid"/>
+                      <a:round/>
+                      <a:headEnd type="none" w="med" len="med"/>
+                      <a:tailEnd type="none" w="med" len="med"/>
+                    </a:lnR>
+                    <a:lnT w="12700" cap="flat" cmpd="sng" algn="ctr">
+                      <a:solidFill>
+                        <a:schemeClr val="tx1"/>
+                      </a:solidFill>
+                      <a:prstDash val="solid"/>
+                      <a:round/>
+                      <a:headEnd type="none" w="med" len="med"/>
+                      <a:tailEnd type="none" w="med" len="med"/>
+                    </a:lnT>
+                    <a:lnB w="12700" cap="flat" cmpd="sng" algn="ctr">
+                      <a:solidFill>
+                        <a:schemeClr val="tx1"/>
+                      </a:solidFill>
+                      <a:prstDash val="solid"/>
+                      <a:round/>
+                      <a:headEnd type="none" w="med" len="med"/>
+                      <a:tailEnd type="none" w="med" len="med"/>
+                    </a:lnB>
+                    <a:noFill/>
+                  </a:tcPr>
+                </a:tc>
+                <a:tc>
+                  <a:txBody>
+                    <a:bodyPr/>
+                    <a:lstStyle/>
+                    <a:p>
+                      <a:endParaRPr lang="en-US" dirty="0"/>
+                    </a:p>
+                  </a:txBody>
+                  <a:tcPr>
+                    <a:lnL w="12700" cap="flat" cmpd="sng" algn="ctr">
+                      <a:solidFill>
+                        <a:schemeClr val="tx1"/>
+                      </a:solidFill>
+                      <a:prstDash val="solid"/>
+                      <a:round/>
+                      <a:headEnd type="none" w="med" len="med"/>
+                      <a:tailEnd type="none" w="med" len="med"/>
+                    </a:lnL>
+                    <a:lnR w="12700" cap="flat" cmpd="sng" algn="ctr">
+                      <a:solidFill>
+                        <a:schemeClr val="tx1"/>
+                      </a:solidFill>
+                      <a:prstDash val="solid"/>
+                      <a:round/>
+                      <a:headEnd type="none" w="med" len="med"/>
+                      <a:tailEnd type="none" w="med" len="med"/>
+                    </a:lnR>
+                    <a:lnT w="12700" cap="flat" cmpd="sng" algn="ctr">
+                      <a:solidFill>
+                        <a:schemeClr val="tx1"/>
+                      </a:solidFill>
+                      <a:prstDash val="solid"/>
+                      <a:round/>
+                      <a:headEnd type="none" w="med" len="med"/>
+                      <a:tailEnd type="none" w="med" len="med"/>
+                    </a:lnT>
+                    <a:lnB w="12700" cap="flat" cmpd="sng" algn="ctr">
+                      <a:solidFill>
+                        <a:schemeClr val="tx1"/>
+                      </a:solidFill>
+                      <a:prstDash val="solid"/>
+                      <a:round/>
+                      <a:headEnd type="none" w="med" len="med"/>
+                      <a:tailEnd type="none" w="med" len="med"/>
+                    </a:lnB>
+                    <a:noFill/>
+                  </a:tcPr>
+                </a:tc>
+                <a:tc>
+                  <a:txBody>
+                    <a:bodyPr/>
+                    <a:lstStyle/>
+                    <a:p>
+                      <a:endParaRPr lang="en-US" dirty="0"/>
+                    </a:p>
+                  </a:txBody>
+                  <a:tcPr>
+                    <a:lnL w="12700" cap="flat" cmpd="sng" algn="ctr">
+                      <a:solidFill>
+                        <a:schemeClr val="tx1"/>
+                      </a:solidFill>
+                      <a:prstDash val="solid"/>
+                      <a:round/>
+                      <a:headEnd type="none" w="med" len="med"/>
+                      <a:tailEnd type="none" w="med" len="med"/>
+                    </a:lnL>
+                    <a:lnR w="12700" cap="flat" cmpd="sng" algn="ctr">
+                      <a:solidFill>
+                        <a:schemeClr val="tx1"/>
+                      </a:solidFill>
+                      <a:prstDash val="solid"/>
+                      <a:round/>
+                      <a:headEnd type="none" w="med" len="med"/>
+                      <a:tailEnd type="none" w="med" len="med"/>
+                    </a:lnR>
+                    <a:lnT w="38100" cmpd="sng">
+                      <a:noFill/>
+                    </a:lnT>
+                    <a:noFill/>
+                  </a:tcPr>
+                </a:tc>
+                <a:extLst>
+                  <a:ext uri="{0D108BD9-81ED-4DB2-BD59-A6C34878D82A}">
+                    <a16:rowId xmlns:a16="http://schemas.microsoft.com/office/drawing/2014/main" val="1036217430"/>
+                  </a:ext>
+                </a:extLst>
+              </a:tr>
+              <a:tr h="881428">
+                <a:tc>
+                  <a:txBody>
+                    <a:bodyPr/>
+                    <a:lstStyle/>
+                    <a:p>
+                      <a:endParaRPr lang="en-US" dirty="0"/>
+                    </a:p>
+                  </a:txBody>
+                  <a:tcPr>
+                    <a:lnL w="12700" cap="flat" cmpd="sng" algn="ctr">
+                      <a:solidFill>
+                        <a:schemeClr val="tx1"/>
+                      </a:solidFill>
+                      <a:prstDash val="solid"/>
+                      <a:round/>
+                      <a:headEnd type="none" w="med" len="med"/>
+                      <a:tailEnd type="none" w="med" len="med"/>
+                    </a:lnL>
+                    <a:lnR w="12700" cap="flat" cmpd="sng" algn="ctr">
+                      <a:solidFill>
+                        <a:schemeClr val="tx1"/>
+                      </a:solidFill>
+                      <a:prstDash val="solid"/>
+                      <a:round/>
+                      <a:headEnd type="none" w="med" len="med"/>
+                      <a:tailEnd type="none" w="med" len="med"/>
+                    </a:lnR>
+                    <a:lnT w="12700" cap="flat" cmpd="sng" algn="ctr">
+                      <a:solidFill>
+                        <a:schemeClr val="tx1"/>
+                      </a:solidFill>
+                      <a:prstDash val="solid"/>
+                      <a:round/>
+                      <a:headEnd type="none" w="med" len="med"/>
+                      <a:tailEnd type="none" w="med" len="med"/>
+                    </a:lnT>
+                    <a:lnB w="12700" cap="flat" cmpd="sng" algn="ctr">
+                      <a:solidFill>
+                        <a:schemeClr val="tx1"/>
+                      </a:solidFill>
+                      <a:prstDash val="solid"/>
+                      <a:round/>
+                      <a:headEnd type="none" w="med" len="med"/>
+                      <a:tailEnd type="none" w="med" len="med"/>
+                    </a:lnB>
+                    <a:noFill/>
+                  </a:tcPr>
+                </a:tc>
+                <a:tc>
+                  <a:txBody>
+                    <a:bodyPr/>
+                    <a:lstStyle/>
+                    <a:p>
+                      <a:endParaRPr lang="en-US" dirty="0"/>
+                    </a:p>
+                  </a:txBody>
+                  <a:tcPr>
+                    <a:lnL w="12700" cap="flat" cmpd="sng" algn="ctr">
+                      <a:solidFill>
+                        <a:schemeClr val="tx1"/>
+                      </a:solidFill>
+                      <a:prstDash val="solid"/>
+                      <a:round/>
+                      <a:headEnd type="none" w="med" len="med"/>
+                      <a:tailEnd type="none" w="med" len="med"/>
+                    </a:lnL>
+                    <a:lnR w="12700" cap="flat" cmpd="sng" algn="ctr">
+                      <a:solidFill>
+                        <a:schemeClr val="tx1"/>
+                      </a:solidFill>
+                      <a:prstDash val="solid"/>
+                      <a:round/>
+                      <a:headEnd type="none" w="med" len="med"/>
+                      <a:tailEnd type="none" w="med" len="med"/>
+                    </a:lnR>
+                    <a:lnT w="12700" cap="flat" cmpd="sng" algn="ctr">
+                      <a:solidFill>
+                        <a:schemeClr val="tx1"/>
+                      </a:solidFill>
+                      <a:prstDash val="solid"/>
+                      <a:round/>
+                      <a:headEnd type="none" w="med" len="med"/>
+                      <a:tailEnd type="none" w="med" len="med"/>
+                    </a:lnT>
+                    <a:lnB w="12700" cap="flat" cmpd="sng" algn="ctr">
+                      <a:solidFill>
+                        <a:schemeClr val="tx1"/>
+                      </a:solidFill>
+                      <a:prstDash val="solid"/>
+                      <a:round/>
+                      <a:headEnd type="none" w="med" len="med"/>
+                      <a:tailEnd type="none" w="med" len="med"/>
+                    </a:lnB>
+                  </a:tcPr>
+                </a:tc>
+                <a:tc>
+                  <a:txBody>
+                    <a:bodyPr/>
+                    <a:lstStyle/>
+                    <a:p>
+                      <a:endParaRPr lang="en-US" dirty="0"/>
+                    </a:p>
+                  </a:txBody>
+                  <a:tcPr>
+                    <a:lnR w="12700" cap="flat" cmpd="sng" algn="ctr">
+                      <a:solidFill>
+                        <a:schemeClr val="tx1"/>
+                      </a:solidFill>
+                      <a:prstDash val="solid"/>
+                      <a:round/>
+                      <a:headEnd type="none" w="med" len="med"/>
+                      <a:tailEnd type="none" w="med" len="med"/>
+                    </a:lnR>
+                    <a:lnT w="12700" cap="flat" cmpd="sng" algn="ctr">
+                      <a:solidFill>
+                        <a:schemeClr val="tx1"/>
+                      </a:solidFill>
+                      <a:prstDash val="solid"/>
+                      <a:round/>
+                      <a:headEnd type="none" w="med" len="med"/>
+                      <a:tailEnd type="none" w="med" len="med"/>
+                    </a:lnT>
+                    <a:lnB w="12700" cap="flat" cmpd="sng" algn="ctr">
+                      <a:solidFill>
+                        <a:schemeClr val="tx1"/>
+                      </a:solidFill>
+                      <a:prstDash val="solid"/>
+                      <a:round/>
+                      <a:headEnd type="none" w="med" len="med"/>
+                      <a:tailEnd type="none" w="med" len="med"/>
+                    </a:lnB>
+                    <a:solidFill>
+                      <a:schemeClr val="tx1"/>
+                    </a:solidFill>
+                  </a:tcPr>
+                </a:tc>
+                <a:tc>
+                  <a:txBody>
+                    <a:bodyPr/>
+                    <a:lstStyle/>
+                    <a:p>
+                      <a:endParaRPr lang="en-US" dirty="0"/>
+                    </a:p>
+                  </a:txBody>
+                  <a:tcPr>
+                    <a:lnR w="12700" cap="flat" cmpd="sng" algn="ctr">
+                      <a:solidFill>
+                        <a:schemeClr val="tx1"/>
+                      </a:solidFill>
+                      <a:prstDash val="solid"/>
+                      <a:round/>
+                      <a:headEnd type="none" w="med" len="med"/>
+                      <a:tailEnd type="none" w="med" len="med"/>
+                    </a:lnR>
+                    <a:lnT w="12700" cap="flat" cmpd="sng" algn="ctr">
+                      <a:solidFill>
+                        <a:schemeClr val="tx1"/>
+                      </a:solidFill>
+                      <a:prstDash val="solid"/>
+                      <a:round/>
+                      <a:headEnd type="none" w="med" len="med"/>
+                      <a:tailEnd type="none" w="med" len="med"/>
+                    </a:lnT>
+                    <a:lnB w="12700" cap="flat" cmpd="sng" algn="ctr">
+                      <a:solidFill>
+                        <a:schemeClr val="tx1"/>
+                      </a:solidFill>
+                      <a:prstDash val="solid"/>
+                      <a:round/>
+                      <a:headEnd type="none" w="med" len="med"/>
+                      <a:tailEnd type="none" w="med" len="med"/>
+                    </a:lnB>
+                    <a:solidFill>
+                      <a:schemeClr val="tx1"/>
+                    </a:solidFill>
+                  </a:tcPr>
+                </a:tc>
+                <a:tc>
+                  <a:txBody>
+                    <a:bodyPr/>
+                    <a:lstStyle/>
+                    <a:p>
+                      <a:endParaRPr lang="en-US" dirty="0"/>
+                    </a:p>
+                  </a:txBody>
+                  <a:tcPr>
+                    <a:lnL w="12700" cap="flat" cmpd="sng" algn="ctr">
+                      <a:solidFill>
+                        <a:schemeClr val="tx1"/>
+                      </a:solidFill>
+                      <a:prstDash val="solid"/>
+                      <a:round/>
+                      <a:headEnd type="none" w="med" len="med"/>
+                      <a:tailEnd type="none" w="med" len="med"/>
+                    </a:lnL>
+                    <a:lnR w="12700" cap="flat" cmpd="sng" algn="ctr">
+                      <a:solidFill>
+                        <a:schemeClr val="tx1"/>
+                      </a:solidFill>
+                      <a:prstDash val="solid"/>
+                      <a:round/>
+                      <a:headEnd type="none" w="med" len="med"/>
+                      <a:tailEnd type="none" w="med" len="med"/>
+                    </a:lnR>
+                    <a:lnT w="12700" cap="flat" cmpd="sng" algn="ctr">
+                      <a:solidFill>
+                        <a:schemeClr val="tx1"/>
+                      </a:solidFill>
+                      <a:prstDash val="solid"/>
+                      <a:round/>
+                      <a:headEnd type="none" w="med" len="med"/>
+                      <a:tailEnd type="none" w="med" len="med"/>
+                    </a:lnT>
+                    <a:lnB w="12700" cap="flat" cmpd="sng" algn="ctr">
+                      <a:solidFill>
+                        <a:schemeClr val="tx1"/>
+                      </a:solidFill>
+                      <a:prstDash val="solid"/>
+                      <a:round/>
+                      <a:headEnd type="none" w="med" len="med"/>
+                      <a:tailEnd type="none" w="med" len="med"/>
+                    </a:lnB>
+                    <a:noFill/>
+                  </a:tcPr>
+                </a:tc>
+                <a:tc>
+                  <a:txBody>
+                    <a:bodyPr/>
+                    <a:lstStyle/>
+                    <a:p>
+                      <a:endParaRPr lang="en-US" dirty="0"/>
+                    </a:p>
+                  </a:txBody>
+                  <a:tcPr>
+                    <a:lnL w="12700" cap="flat" cmpd="sng" algn="ctr">
+                      <a:solidFill>
+                        <a:schemeClr val="tx1"/>
+                      </a:solidFill>
+                      <a:prstDash val="solid"/>
+                      <a:round/>
+                      <a:headEnd type="none" w="med" len="med"/>
+                      <a:tailEnd type="none" w="med" len="med"/>
+                    </a:lnL>
+                    <a:lnR w="12700" cap="flat" cmpd="sng" algn="ctr">
+                      <a:solidFill>
+                        <a:schemeClr val="tx1"/>
+                      </a:solidFill>
+                      <a:prstDash val="solid"/>
+                      <a:round/>
+                      <a:headEnd type="none" w="med" len="med"/>
+                      <a:tailEnd type="none" w="med" len="med"/>
+                    </a:lnR>
+                    <a:lnT w="12700" cap="flat" cmpd="sng" algn="ctr">
+                      <a:solidFill>
+                        <a:schemeClr val="tx1"/>
+                      </a:solidFill>
+                      <a:prstDash val="solid"/>
+                      <a:round/>
+                      <a:headEnd type="none" w="med" len="med"/>
+                      <a:tailEnd type="none" w="med" len="med"/>
+                    </a:lnT>
+                    <a:lnB w="12700" cap="flat" cmpd="sng" algn="ctr">
+                      <a:solidFill>
+                        <a:schemeClr val="tx1"/>
+                      </a:solidFill>
+                      <a:prstDash val="solid"/>
+                      <a:round/>
+                      <a:headEnd type="none" w="med" len="med"/>
+                      <a:tailEnd type="none" w="med" len="med"/>
+                    </a:lnB>
+                    <a:noFill/>
+                  </a:tcPr>
+                </a:tc>
+                <a:tc>
+                  <a:txBody>
+                    <a:bodyPr/>
+                    <a:lstStyle/>
+                    <a:p>
+                      <a:endParaRPr lang="en-US" dirty="0"/>
+                    </a:p>
+                  </a:txBody>
+                  <a:tcPr>
+                    <a:lnL w="12700" cap="flat" cmpd="sng" algn="ctr">
+                      <a:solidFill>
+                        <a:schemeClr val="tx1"/>
+                      </a:solidFill>
+                      <a:prstDash val="solid"/>
+                      <a:round/>
+                      <a:headEnd type="none" w="med" len="med"/>
+                      <a:tailEnd type="none" w="med" len="med"/>
+                    </a:lnL>
+                    <a:lnR w="12700" cap="flat" cmpd="sng" algn="ctr">
+                      <a:solidFill>
+                        <a:schemeClr val="tx1"/>
+                      </a:solidFill>
+                      <a:prstDash val="solid"/>
+                      <a:round/>
+                      <a:headEnd type="none" w="med" len="med"/>
+                      <a:tailEnd type="none" w="med" len="med"/>
+                    </a:lnR>
+                    <a:lnT w="12700" cap="flat" cmpd="sng" algn="ctr">
+                      <a:solidFill>
+                        <a:schemeClr val="tx1"/>
+                      </a:solidFill>
+                      <a:prstDash val="solid"/>
+                      <a:round/>
+                      <a:headEnd type="none" w="med" len="med"/>
+                      <a:tailEnd type="none" w="med" len="med"/>
+                    </a:lnT>
+                    <a:lnB w="12700" cap="flat" cmpd="sng" algn="ctr">
+                      <a:solidFill>
+                        <a:schemeClr val="tx1"/>
+                      </a:solidFill>
+                      <a:prstDash val="solid"/>
+                      <a:round/>
+                      <a:headEnd type="none" w="med" len="med"/>
+                      <a:tailEnd type="none" w="med" len="med"/>
+                    </a:lnB>
+                    <a:noFill/>
+                  </a:tcPr>
+                </a:tc>
+                <a:tc>
+                  <a:txBody>
+                    <a:bodyPr/>
+                    <a:lstStyle/>
+                    <a:p>
+                      <a:endParaRPr lang="en-US" dirty="0"/>
+                    </a:p>
+                  </a:txBody>
+                  <a:tcPr>
+                    <a:lnL w="12700" cap="flat" cmpd="sng" algn="ctr">
+                      <a:solidFill>
+                        <a:schemeClr val="tx1"/>
+                      </a:solidFill>
+                      <a:prstDash val="solid"/>
+                      <a:round/>
+                      <a:headEnd type="none" w="med" len="med"/>
+                      <a:tailEnd type="none" w="med" len="med"/>
+                    </a:lnL>
+                    <a:lnR w="12700" cap="flat" cmpd="sng" algn="ctr">
+                      <a:solidFill>
+                        <a:schemeClr val="tx1"/>
+                      </a:solidFill>
+                      <a:prstDash val="solid"/>
+                      <a:round/>
+                      <a:headEnd type="none" w="med" len="med"/>
+                      <a:tailEnd type="none" w="med" len="med"/>
+                    </a:lnR>
+                    <a:lnT w="12700" cap="flat" cmpd="sng" algn="ctr">
+                      <a:solidFill>
+                        <a:schemeClr val="tx1"/>
+                      </a:solidFill>
+                      <a:prstDash val="solid"/>
+                      <a:round/>
+                      <a:headEnd type="none" w="med" len="med"/>
+                      <a:tailEnd type="none" w="med" len="med"/>
+                    </a:lnT>
+                    <a:lnB w="12700" cap="flat" cmpd="sng" algn="ctr">
+                      <a:solidFill>
+                        <a:schemeClr val="tx1"/>
+                      </a:solidFill>
+                      <a:prstDash val="solid"/>
+                      <a:round/>
+                      <a:headEnd type="none" w="med" len="med"/>
+                      <a:tailEnd type="none" w="med" len="med"/>
+                    </a:lnB>
+                    <a:solidFill>
+                      <a:schemeClr val="tx1"/>
+                    </a:solidFill>
+                  </a:tcPr>
+                </a:tc>
+                <a:tc>
+                  <a:txBody>
+                    <a:bodyPr/>
+                    <a:lstStyle/>
+                    <a:p>
+                      <a:endParaRPr lang="en-US" dirty="0"/>
+                    </a:p>
+                  </a:txBody>
+                  <a:tcPr>
+                    <a:lnL w="12700" cap="flat" cmpd="sng" algn="ctr">
+                      <a:solidFill>
+                        <a:schemeClr val="tx1"/>
+                      </a:solidFill>
+                      <a:prstDash val="solid"/>
+                      <a:round/>
+                      <a:headEnd type="none" w="med" len="med"/>
+                      <a:tailEnd type="none" w="med" len="med"/>
+                    </a:lnL>
+                    <a:lnR w="12700" cap="flat" cmpd="sng" algn="ctr">
+                      <a:solidFill>
+                        <a:schemeClr val="tx1"/>
+                      </a:solidFill>
+                      <a:prstDash val="solid"/>
+                      <a:round/>
+                      <a:headEnd type="none" w="med" len="med"/>
+                      <a:tailEnd type="none" w="med" len="med"/>
+                    </a:lnR>
+                    <a:solidFill>
+                      <a:schemeClr val="tx1"/>
+                    </a:solidFill>
+                  </a:tcPr>
+                </a:tc>
+                <a:extLst>
+                  <a:ext uri="{0D108BD9-81ED-4DB2-BD59-A6C34878D82A}">
+                    <a16:rowId xmlns:a16="http://schemas.microsoft.com/office/drawing/2014/main" val="462067154"/>
+                  </a:ext>
+                </a:extLst>
+              </a:tr>
+              <a:tr h="881428">
+                <a:tc>
+                  <a:txBody>
+                    <a:bodyPr/>
+                    <a:lstStyle/>
+                    <a:p>
+                      <a:endParaRPr lang="en-US" dirty="0"/>
+                    </a:p>
+                  </a:txBody>
+                  <a:tcPr>
+                    <a:lnL w="12700" cap="flat" cmpd="sng" algn="ctr">
+                      <a:solidFill>
+                        <a:schemeClr val="tx1"/>
+                      </a:solidFill>
+                      <a:prstDash val="solid"/>
+                      <a:round/>
+                      <a:headEnd type="none" w="med" len="med"/>
+                      <a:tailEnd type="none" w="med" len="med"/>
+                    </a:lnL>
+                    <a:lnR w="12700" cap="flat" cmpd="sng" algn="ctr">
+                      <a:solidFill>
+                        <a:schemeClr val="tx1"/>
+                      </a:solidFill>
+                      <a:prstDash val="solid"/>
+                      <a:round/>
+                      <a:headEnd type="none" w="med" len="med"/>
+                      <a:tailEnd type="none" w="med" len="med"/>
+                    </a:lnR>
+                    <a:lnT w="12700" cap="flat" cmpd="sng" algn="ctr">
+                      <a:solidFill>
+                        <a:schemeClr val="tx1"/>
+                      </a:solidFill>
+                      <a:prstDash val="solid"/>
+                      <a:round/>
+                      <a:headEnd type="none" w="med" len="med"/>
+                      <a:tailEnd type="none" w="med" len="med"/>
+                    </a:lnT>
+                    <a:lnB w="12700" cap="flat" cmpd="sng" algn="ctr">
+                      <a:solidFill>
+                        <a:schemeClr val="tx1"/>
+                      </a:solidFill>
+                      <a:prstDash val="solid"/>
+                      <a:round/>
+                      <a:headEnd type="none" w="med" len="med"/>
+                      <a:tailEnd type="none" w="med" len="med"/>
+                    </a:lnB>
+                    <a:noFill/>
+                  </a:tcPr>
+                </a:tc>
+                <a:tc>
+                  <a:txBody>
+                    <a:bodyPr/>
+                    <a:lstStyle/>
+                    <a:p>
+                      <a:endParaRPr lang="en-US" dirty="0"/>
+                    </a:p>
+                  </a:txBody>
+                  <a:tcPr>
+                    <a:lnL w="12700" cap="flat" cmpd="sng" algn="ctr">
+                      <a:solidFill>
+                        <a:schemeClr val="tx1"/>
+                      </a:solidFill>
+                      <a:prstDash val="solid"/>
+                      <a:round/>
+                      <a:headEnd type="none" w="med" len="med"/>
+                      <a:tailEnd type="none" w="med" len="med"/>
+                    </a:lnL>
+                    <a:lnR w="12700" cap="flat" cmpd="sng" algn="ctr">
+                      <a:solidFill>
+                        <a:schemeClr val="tx1"/>
+                      </a:solidFill>
+                      <a:prstDash val="solid"/>
+                      <a:round/>
+                      <a:headEnd type="none" w="med" len="med"/>
+                      <a:tailEnd type="none" w="med" len="med"/>
+                    </a:lnR>
+                    <a:lnT w="12700" cap="flat" cmpd="sng" algn="ctr">
+                      <a:solidFill>
+                        <a:schemeClr val="tx1"/>
+                      </a:solidFill>
+                      <a:prstDash val="solid"/>
+                      <a:round/>
+                      <a:headEnd type="none" w="med" len="med"/>
+                      <a:tailEnd type="none" w="med" len="med"/>
+                    </a:lnT>
+                    <a:lnB w="12700" cap="flat" cmpd="sng" algn="ctr">
+                      <a:solidFill>
+                        <a:schemeClr val="tx1"/>
+                      </a:solidFill>
+                      <a:prstDash val="solid"/>
+                      <a:round/>
+                      <a:headEnd type="none" w="med" len="med"/>
+                      <a:tailEnd type="none" w="med" len="med"/>
+                    </a:lnB>
+                    <a:noFill/>
+                  </a:tcPr>
+                </a:tc>
+                <a:tc>
+                  <a:txBody>
+                    <a:bodyPr/>
+                    <a:lstStyle/>
+                    <a:p>
+                      <a:endParaRPr lang="en-US" dirty="0"/>
+                    </a:p>
+                  </a:txBody>
+                  <a:tcPr>
+                    <a:lnL w="12700" cap="flat" cmpd="sng" algn="ctr">
+                      <a:solidFill>
+                        <a:schemeClr val="tx1"/>
+                      </a:solidFill>
+                      <a:prstDash val="solid"/>
+                      <a:round/>
+                      <a:headEnd type="none" w="med" len="med"/>
+                      <a:tailEnd type="none" w="med" len="med"/>
+                    </a:lnL>
+                    <a:lnR w="12700" cap="flat" cmpd="sng" algn="ctr">
+                      <a:solidFill>
+                        <a:schemeClr val="tx1"/>
+                      </a:solidFill>
+                      <a:prstDash val="solid"/>
+                      <a:round/>
+                      <a:headEnd type="none" w="med" len="med"/>
+                      <a:tailEnd type="none" w="med" len="med"/>
+                    </a:lnR>
+                    <a:lnT w="12700" cap="flat" cmpd="sng" algn="ctr">
+                      <a:solidFill>
+                        <a:schemeClr val="tx1"/>
+                      </a:solidFill>
+                      <a:prstDash val="solid"/>
+                      <a:round/>
+                      <a:headEnd type="none" w="med" len="med"/>
+                      <a:tailEnd type="none" w="med" len="med"/>
+                    </a:lnT>
+                    <a:lnB w="12700" cap="flat" cmpd="sng" algn="ctr">
+                      <a:solidFill>
+                        <a:schemeClr val="tx1"/>
+                      </a:solidFill>
+                      <a:prstDash val="solid"/>
+                      <a:round/>
+                      <a:headEnd type="none" w="med" len="med"/>
+                      <a:tailEnd type="none" w="med" len="med"/>
+                    </a:lnB>
+                    <a:noFill/>
+                  </a:tcPr>
+                </a:tc>
+                <a:tc>
+                  <a:txBody>
+                    <a:bodyPr/>
+                    <a:lstStyle/>
+                    <a:p>
+                      <a:endParaRPr lang="en-US" dirty="0"/>
+                    </a:p>
+                  </a:txBody>
+                  <a:tcPr>
+                    <a:lnL w="12700" cap="flat" cmpd="sng" algn="ctr">
+                      <a:solidFill>
+                        <a:schemeClr val="tx1"/>
+                      </a:solidFill>
+                      <a:prstDash val="solid"/>
+                      <a:round/>
+                      <a:headEnd type="none" w="med" len="med"/>
+                      <a:tailEnd type="none" w="med" len="med"/>
+                    </a:lnL>
+                    <a:lnR w="12700" cap="flat" cmpd="sng" algn="ctr">
+                      <a:solidFill>
+                        <a:schemeClr val="tx1"/>
+                      </a:solidFill>
+                      <a:prstDash val="solid"/>
+                      <a:round/>
+                      <a:headEnd type="none" w="med" len="med"/>
+                      <a:tailEnd type="none" w="med" len="med"/>
+                    </a:lnR>
+                    <a:lnT w="12700" cap="flat" cmpd="sng" algn="ctr">
+                      <a:solidFill>
+                        <a:schemeClr val="tx1"/>
+                      </a:solidFill>
+                      <a:prstDash val="solid"/>
+                      <a:round/>
+                      <a:headEnd type="none" w="med" len="med"/>
+                      <a:tailEnd type="none" w="med" len="med"/>
+                    </a:lnT>
+                    <a:lnB w="12700" cap="flat" cmpd="sng" algn="ctr">
+                      <a:solidFill>
+                        <a:schemeClr val="tx1"/>
+                      </a:solidFill>
+                      <a:prstDash val="solid"/>
+                      <a:round/>
+                      <a:headEnd type="none" w="med" len="med"/>
+                      <a:tailEnd type="none" w="med" len="med"/>
+                    </a:lnB>
+                    <a:noFill/>
+                  </a:tcPr>
+                </a:tc>
+                <a:tc>
+                  <a:txBody>
+                    <a:bodyPr/>
+                    <a:lstStyle/>
+                    <a:p>
+                      <a:endParaRPr lang="en-US" dirty="0"/>
+                    </a:p>
+                  </a:txBody>
+                  <a:tcPr>
+                    <a:lnL w="12700" cap="flat" cmpd="sng" algn="ctr">
+                      <a:solidFill>
+                        <a:schemeClr val="tx1"/>
+                      </a:solidFill>
+                      <a:prstDash val="solid"/>
+                      <a:round/>
+                      <a:headEnd type="none" w="med" len="med"/>
+                      <a:tailEnd type="none" w="med" len="med"/>
+                    </a:lnL>
+                    <a:lnR w="12700" cap="flat" cmpd="sng" algn="ctr">
+                      <a:solidFill>
+                        <a:schemeClr val="tx1"/>
+                      </a:solidFill>
+                      <a:prstDash val="solid"/>
+                      <a:round/>
+                      <a:headEnd type="none" w="med" len="med"/>
+                      <a:tailEnd type="none" w="med" len="med"/>
+                    </a:lnR>
+                    <a:lnT w="12700" cap="flat" cmpd="sng" algn="ctr">
+                      <a:solidFill>
+                        <a:schemeClr val="tx1"/>
+                      </a:solidFill>
+                      <a:prstDash val="solid"/>
+                      <a:round/>
+                      <a:headEnd type="none" w="med" len="med"/>
+                      <a:tailEnd type="none" w="med" len="med"/>
+                    </a:lnT>
+                    <a:lnB w="12700" cap="flat" cmpd="sng" algn="ctr">
+                      <a:solidFill>
+                        <a:schemeClr val="tx1"/>
+                      </a:solidFill>
+                      <a:prstDash val="solid"/>
+                      <a:round/>
+                      <a:headEnd type="none" w="med" len="med"/>
+                      <a:tailEnd type="none" w="med" len="med"/>
+                    </a:lnB>
+                    <a:noFill/>
+                  </a:tcPr>
+                </a:tc>
+                <a:tc>
+                  <a:txBody>
+                    <a:bodyPr/>
+                    <a:lstStyle/>
+                    <a:p>
+                      <a:endParaRPr lang="en-US" dirty="0"/>
+                    </a:p>
+                  </a:txBody>
+                  <a:tcPr>
+                    <a:lnL w="12700" cap="flat" cmpd="sng" algn="ctr">
+                      <a:solidFill>
+                        <a:schemeClr val="tx1"/>
+                      </a:solidFill>
+                      <a:prstDash val="solid"/>
+                      <a:round/>
+                      <a:headEnd type="none" w="med" len="med"/>
+                      <a:tailEnd type="none" w="med" len="med"/>
+                    </a:lnL>
+                    <a:lnR w="12700" cap="flat" cmpd="sng" algn="ctr">
+                      <a:solidFill>
+                        <a:schemeClr val="tx1"/>
+                      </a:solidFill>
+                      <a:prstDash val="solid"/>
+                      <a:round/>
+                      <a:headEnd type="none" w="med" len="med"/>
+                      <a:tailEnd type="none" w="med" len="med"/>
+                    </a:lnR>
+                    <a:lnT w="12700" cap="flat" cmpd="sng" algn="ctr">
+                      <a:solidFill>
+                        <a:schemeClr val="tx1"/>
+                      </a:solidFill>
+                      <a:prstDash val="solid"/>
+                      <a:round/>
+                      <a:headEnd type="none" w="med" len="med"/>
+                      <a:tailEnd type="none" w="med" len="med"/>
+                    </a:lnT>
+                    <a:lnB w="12700" cap="flat" cmpd="sng" algn="ctr">
+                      <a:solidFill>
+                        <a:schemeClr val="tx1"/>
+                      </a:solidFill>
+                      <a:prstDash val="solid"/>
+                      <a:round/>
+                      <a:headEnd type="none" w="med" len="med"/>
+                      <a:tailEnd type="none" w="med" len="med"/>
+                    </a:lnB>
+                    <a:noFill/>
+                  </a:tcPr>
+                </a:tc>
+                <a:tc>
+                  <a:txBody>
+                    <a:bodyPr/>
+                    <a:lstStyle/>
+                    <a:p>
+                      <a:endParaRPr lang="en-US" dirty="0"/>
+                    </a:p>
+                  </a:txBody>
+                  <a:tcPr>
+                    <a:lnL w="12700" cap="flat" cmpd="sng" algn="ctr">
+                      <a:solidFill>
+                        <a:schemeClr val="tx1"/>
+                      </a:solidFill>
+                      <a:prstDash val="solid"/>
+                      <a:round/>
+                      <a:headEnd type="none" w="med" len="med"/>
+                      <a:tailEnd type="none" w="med" len="med"/>
+                    </a:lnL>
+                    <a:lnR w="12700" cap="flat" cmpd="sng" algn="ctr">
+                      <a:solidFill>
+                        <a:schemeClr val="tx1"/>
+                      </a:solidFill>
+                      <a:prstDash val="solid"/>
+                      <a:round/>
+                      <a:headEnd type="none" w="med" len="med"/>
+                      <a:tailEnd type="none" w="med" len="med"/>
+                    </a:lnR>
+                    <a:lnT w="12700" cap="flat" cmpd="sng" algn="ctr">
+                      <a:solidFill>
+                        <a:schemeClr val="tx1"/>
+                      </a:solidFill>
+                      <a:prstDash val="solid"/>
+                      <a:round/>
+                      <a:headEnd type="none" w="med" len="med"/>
+                      <a:tailEnd type="none" w="med" len="med"/>
+                    </a:lnT>
+                    <a:lnB w="12700" cap="flat" cmpd="sng" algn="ctr">
+                      <a:solidFill>
+                        <a:schemeClr val="tx1"/>
+                      </a:solidFill>
+                      <a:prstDash val="solid"/>
+                      <a:round/>
+                      <a:headEnd type="none" w="med" len="med"/>
+                      <a:tailEnd type="none" w="med" len="med"/>
+                    </a:lnB>
+                    <a:noFill/>
+                  </a:tcPr>
+                </a:tc>
+                <a:tc>
+                  <a:txBody>
+                    <a:bodyPr/>
+                    <a:lstStyle/>
+                    <a:p>
+                      <a:endParaRPr lang="en-US" dirty="0"/>
+                    </a:p>
+                  </a:txBody>
+                  <a:tcPr>
+                    <a:lnL w="12700" cap="flat" cmpd="sng" algn="ctr">
+                      <a:solidFill>
+                        <a:schemeClr val="tx1"/>
+                      </a:solidFill>
+                      <a:prstDash val="solid"/>
+                      <a:round/>
+                      <a:headEnd type="none" w="med" len="med"/>
+                      <a:tailEnd type="none" w="med" len="med"/>
+                    </a:lnL>
+                    <a:lnR w="12700" cap="flat" cmpd="sng" algn="ctr">
+                      <a:solidFill>
+                        <a:schemeClr val="tx1"/>
+                      </a:solidFill>
+                      <a:prstDash val="solid"/>
+                      <a:round/>
+                      <a:headEnd type="none" w="med" len="med"/>
+                      <a:tailEnd type="none" w="med" len="med"/>
+                    </a:lnR>
+                    <a:lnT w="12700" cap="flat" cmpd="sng" algn="ctr">
+                      <a:solidFill>
+                        <a:schemeClr val="tx1"/>
+                      </a:solidFill>
+                      <a:prstDash val="solid"/>
+                      <a:round/>
+                      <a:headEnd type="none" w="med" len="med"/>
+                      <a:tailEnd type="none" w="med" len="med"/>
+                    </a:lnT>
+                    <a:lnB w="12700" cap="flat" cmpd="sng" algn="ctr">
+                      <a:solidFill>
+                        <a:schemeClr val="tx1"/>
+                      </a:solidFill>
+                      <a:prstDash val="solid"/>
+                      <a:round/>
+                      <a:headEnd type="none" w="med" len="med"/>
+                      <a:tailEnd type="none" w="med" len="med"/>
+                    </a:lnB>
+                    <a:noFill/>
+                  </a:tcPr>
+                </a:tc>
+                <a:tc>
+                  <a:txBody>
+                    <a:bodyPr/>
+                    <a:lstStyle/>
+                    <a:p>
+                      <a:endParaRPr lang="en-US" dirty="0"/>
+                    </a:p>
+                  </a:txBody>
+                  <a:tcPr>
+                    <a:lnL w="12700" cap="flat" cmpd="sng" algn="ctr">
+                      <a:solidFill>
+                        <a:schemeClr val="tx1"/>
+                      </a:solidFill>
+                      <a:prstDash val="solid"/>
+                      <a:round/>
+                      <a:headEnd type="none" w="med" len="med"/>
+                      <a:tailEnd type="none" w="med" len="med"/>
+                    </a:lnL>
+                    <a:lnR w="12700" cap="flat" cmpd="sng" algn="ctr">
+                      <a:solidFill>
+                        <a:schemeClr val="tx1"/>
+                      </a:solidFill>
+                      <a:prstDash val="solid"/>
+                      <a:round/>
+                      <a:headEnd type="none" w="med" len="med"/>
+                      <a:tailEnd type="none" w="med" len="med"/>
+                    </a:lnR>
+                    <a:lnB w="12700" cmpd="sng">
+                      <a:noFill/>
+                    </a:lnB>
+                    <a:noFill/>
+                  </a:tcPr>
+                </a:tc>
+                <a:extLst>
+                  <a:ext uri="{0D108BD9-81ED-4DB2-BD59-A6C34878D82A}">
+                    <a16:rowId xmlns:a16="http://schemas.microsoft.com/office/drawing/2014/main" val="246040910"/>
+                  </a:ext>
+                </a:extLst>
+              </a:tr>
+              <a:tr h="881428">
+                <a:tc gridSpan="9">
+                  <a:txBody>
+                    <a:bodyPr/>
+                    <a:lstStyle/>
+                    <a:p>
+                      <a:endParaRPr lang="en-US" dirty="0"/>
+                    </a:p>
+                  </a:txBody>
+                  <a:tcPr>
+                    <a:lnL w="12700" cmpd="sng">
+                      <a:noFill/>
+                    </a:lnL>
+                    <a:lnR w="12700" cmpd="sng">
+                      <a:noFill/>
+                    </a:lnR>
+                    <a:lnT w="12700" cap="flat" cmpd="sng" algn="ctr">
+                      <a:solidFill>
+                        <a:schemeClr val="tx1"/>
+                      </a:solidFill>
+                      <a:prstDash val="solid"/>
+                      <a:round/>
+                      <a:headEnd type="none" w="med" len="med"/>
+                      <a:tailEnd type="none" w="med" len="med"/>
+                    </a:lnT>
+                    <a:lnB w="12700" cmpd="sng">
+                      <a:noFill/>
+                    </a:lnB>
+                    <a:lnTlToBr w="12700" cmpd="sng">
+                      <a:noFill/>
+                      <a:prstDash val="solid"/>
+                    </a:lnTlToBr>
+                    <a:lnBlToTr w="12700" cmpd="sng">
+                      <a:noFill/>
+                      <a:prstDash val="solid"/>
+                    </a:lnBlToTr>
+                    <a:solidFill>
+                      <a:schemeClr val="tx1"/>
+                    </a:solidFill>
+                  </a:tcPr>
+                </a:tc>
+                <a:tc hMerge="1">
+                  <a:txBody>
+                    <a:bodyPr/>
+                    <a:lstStyle/>
+                    <a:p>
+                      <a:endParaRPr lang="en-US" dirty="0"/>
+                    </a:p>
+                  </a:txBody>
+                  <a:tcPr>
+                    <a:solidFill>
+                      <a:schemeClr val="tx1"/>
+                    </a:solidFill>
+                  </a:tcPr>
+                </a:tc>
+                <a:tc hMerge="1">
+                  <a:txBody>
+                    <a:bodyPr/>
+                    <a:lstStyle/>
+                    <a:p>
+                      <a:endParaRPr lang="en-US" dirty="0"/>
+                    </a:p>
+                  </a:txBody>
+                  <a:tcPr>
+                    <a:lnT w="12700" cap="flat" cmpd="sng" algn="ctr">
+                      <a:solidFill>
+                        <a:schemeClr val="tx1"/>
+                      </a:solidFill>
+                      <a:prstDash val="solid"/>
+                      <a:round/>
+                      <a:headEnd type="none" w="med" len="med"/>
+                      <a:tailEnd type="none" w="med" len="med"/>
+                    </a:lnT>
+                    <a:solidFill>
+                      <a:schemeClr val="tx1"/>
+                    </a:solidFill>
+                  </a:tcPr>
+                </a:tc>
+                <a:tc hMerge="1">
+                  <a:txBody>
+                    <a:bodyPr/>
+                    <a:lstStyle/>
+                    <a:p>
+                      <a:endParaRPr lang="en-US" dirty="0"/>
+                    </a:p>
+                  </a:txBody>
+                  <a:tcPr>
+                    <a:lnT w="12700" cap="flat" cmpd="sng" algn="ctr">
+                      <a:solidFill>
+                        <a:schemeClr val="tx1"/>
+                      </a:solidFill>
+                      <a:prstDash val="solid"/>
+                      <a:round/>
+                      <a:headEnd type="none" w="med" len="med"/>
+                      <a:tailEnd type="none" w="med" len="med"/>
+                    </a:lnT>
+                    <a:solidFill>
+                      <a:schemeClr val="tx1"/>
+                    </a:solidFill>
+                  </a:tcPr>
+                </a:tc>
+                <a:tc hMerge="1">
+                  <a:txBody>
+                    <a:bodyPr/>
+                    <a:lstStyle/>
+                    <a:p>
+                      <a:endParaRPr lang="en-US" dirty="0"/>
+                    </a:p>
+                  </a:txBody>
+                  <a:tcPr>
+                    <a:lnT w="12700" cap="flat" cmpd="sng" algn="ctr">
+                      <a:solidFill>
+                        <a:schemeClr val="tx1"/>
+                      </a:solidFill>
+                      <a:prstDash val="solid"/>
+                      <a:round/>
+                      <a:headEnd type="none" w="med" len="med"/>
+                      <a:tailEnd type="none" w="med" len="med"/>
+                    </a:lnT>
+                    <a:solidFill>
+                      <a:schemeClr val="tx1"/>
+                    </a:solidFill>
+                  </a:tcPr>
+                </a:tc>
+                <a:tc hMerge="1">
+                  <a:txBody>
+                    <a:bodyPr/>
+                    <a:lstStyle/>
+                    <a:p>
+                      <a:endParaRPr lang="en-US" dirty="0"/>
+                    </a:p>
+                  </a:txBody>
+                  <a:tcPr>
+                    <a:lnT w="12700" cap="flat" cmpd="sng" algn="ctr">
+                      <a:solidFill>
+                        <a:schemeClr val="tx1"/>
+                      </a:solidFill>
+                      <a:prstDash val="solid"/>
+                      <a:round/>
+                      <a:headEnd type="none" w="med" len="med"/>
+                      <a:tailEnd type="none" w="med" len="med"/>
+                    </a:lnT>
+                    <a:solidFill>
+                      <a:schemeClr val="tx1"/>
+                    </a:solidFill>
+                  </a:tcPr>
+                </a:tc>
+                <a:tc hMerge="1">
+                  <a:txBody>
+                    <a:bodyPr/>
+                    <a:lstStyle/>
+                    <a:p>
+                      <a:endParaRPr lang="en-US" dirty="0"/>
+                    </a:p>
+                  </a:txBody>
+                  <a:tcPr>
+                    <a:solidFill>
+                      <a:schemeClr val="tx1"/>
+                    </a:solidFill>
+                  </a:tcPr>
+                </a:tc>
+                <a:tc hMerge="1">
+                  <a:txBody>
+                    <a:bodyPr/>
+                    <a:lstStyle/>
+                    <a:p>
+                      <a:endParaRPr lang="en-US" dirty="0"/>
+                    </a:p>
+                  </a:txBody>
+                  <a:tcPr>
+                    <a:solidFill>
+                      <a:schemeClr val="tx1"/>
+                    </a:solidFill>
+                  </a:tcPr>
+                </a:tc>
+                <a:tc hMerge="1">
+                  <a:txBody>
+                    <a:bodyPr/>
+                    <a:lstStyle/>
+                    <a:p>
+                      <a:endParaRPr lang="en-US" dirty="0"/>
+                    </a:p>
+                  </a:txBody>
+                  <a:tcPr>
+                    <a:solidFill>
+                      <a:schemeClr val="tx1"/>
+                    </a:solidFill>
+                  </a:tcPr>
+                </a:tc>
+                <a:extLst>
+                  <a:ext uri="{0D108BD9-81ED-4DB2-BD59-A6C34878D82A}">
+                    <a16:rowId xmlns:a16="http://schemas.microsoft.com/office/drawing/2014/main" val="2853565777"/>
+                  </a:ext>
+                </a:extLst>
+              </a:tr>
+            </a:tbl>
+          </a:graphicData>
+        </a:graphic>
+      </p:graphicFrame>
+      <p:pic>
+        <p:nvPicPr>
+          <p:cNvPr id="5" name="Picture 4" descr="A dog sitting on a wood floor&#10;&#10;Description automatically generated with medium confidence">
+            <a:extLst>
+              <a:ext uri="{FF2B5EF4-FFF2-40B4-BE49-F238E27FC236}">
+                <a16:creationId xmlns:a16="http://schemas.microsoft.com/office/drawing/2014/main" id="{80618ACC-F5CF-074B-A771-C2E30DE201E9}"/>
+              </a:ext>
+            </a:extLst>
+          </p:cNvPr>
+          <p:cNvPicPr>
+            <a:picLocks noChangeAspect="1"/>
+          </p:cNvPicPr>
+          <p:nvPr/>
+        </p:nvPicPr>
+        <p:blipFill>
+          <a:blip r:embed="rId2"/>
+          <a:stretch>
+            <a:fillRect/>
+          </a:stretch>
+        </p:blipFill>
+        <p:spPr>
+          <a:xfrm>
+            <a:off x="9419034" y="3361876"/>
+            <a:ext cx="663144" cy="884193"/>
+          </a:xfrm>
+          <a:prstGeom prst="rect">
+            <a:avLst/>
+          </a:prstGeom>
+        </p:spPr>
+      </p:pic>
+      <p:pic>
+        <p:nvPicPr>
+          <p:cNvPr id="6" name="Picture 5">
+            <a:extLst>
+              <a:ext uri="{FF2B5EF4-FFF2-40B4-BE49-F238E27FC236}">
+                <a16:creationId xmlns:a16="http://schemas.microsoft.com/office/drawing/2014/main" id="{FD8CABCF-B40C-6A4F-8731-79EBBB2CFB2A}"/>
+              </a:ext>
+            </a:extLst>
+          </p:cNvPr>
+          <p:cNvPicPr>
+            <a:picLocks noChangeAspect="1"/>
+          </p:cNvPicPr>
+          <p:nvPr/>
+        </p:nvPicPr>
+        <p:blipFill>
+          <a:blip r:embed="rId3"/>
+          <a:stretch>
+            <a:fillRect/>
+          </a:stretch>
+        </p:blipFill>
+        <p:spPr>
+          <a:xfrm>
+            <a:off x="7905154" y="-1267487"/>
+            <a:ext cx="654927" cy="333721"/>
+          </a:xfrm>
+          <a:prstGeom prst="rect">
+            <a:avLst/>
+          </a:prstGeom>
+          <a:solidFill>
+            <a:srgbClr val="FF0000"/>
+          </a:solidFill>
+        </p:spPr>
+      </p:pic>
+      <p:pic>
+        <p:nvPicPr>
+          <p:cNvPr id="8" name="Picture 7" descr="A picture containing text, clipart&#10;&#10;Description automatically generated">
+            <a:extLst>
+              <a:ext uri="{FF2B5EF4-FFF2-40B4-BE49-F238E27FC236}">
+                <a16:creationId xmlns:a16="http://schemas.microsoft.com/office/drawing/2014/main" id="{57B9A12F-B8C3-2B42-AEBF-BBF9E43BF258}"/>
+              </a:ext>
+            </a:extLst>
+          </p:cNvPr>
+          <p:cNvPicPr>
+            <a:picLocks noChangeAspect="1"/>
+          </p:cNvPicPr>
+          <p:nvPr/>
+        </p:nvPicPr>
+        <p:blipFill>
+          <a:blip r:embed="rId4"/>
+          <a:stretch>
+            <a:fillRect/>
+          </a:stretch>
+        </p:blipFill>
+        <p:spPr>
+          <a:xfrm>
+            <a:off x="7604068" y="1928388"/>
+            <a:ext cx="602171" cy="306560"/>
+          </a:xfrm>
+          <a:prstGeom prst="rect">
+            <a:avLst/>
+          </a:prstGeom>
+        </p:spPr>
+      </p:pic>
+      <p:pic>
+        <p:nvPicPr>
+          <p:cNvPr id="10" name="Picture 9" descr="A picture containing clipart&#10;&#10;Description automatically generated">
+            <a:extLst>
+              <a:ext uri="{FF2B5EF4-FFF2-40B4-BE49-F238E27FC236}">
+                <a16:creationId xmlns:a16="http://schemas.microsoft.com/office/drawing/2014/main" id="{250664E0-C569-C946-8184-0CC2E85CF06C}"/>
+              </a:ext>
+            </a:extLst>
+          </p:cNvPr>
+          <p:cNvPicPr>
+            <a:picLocks noChangeAspect="1"/>
+          </p:cNvPicPr>
+          <p:nvPr/>
+        </p:nvPicPr>
+        <p:blipFill>
+          <a:blip r:embed="rId5"/>
+          <a:stretch>
+            <a:fillRect/>
+          </a:stretch>
+        </p:blipFill>
+        <p:spPr>
+          <a:xfrm>
+            <a:off x="6636190" y="3615221"/>
+            <a:ext cx="773630" cy="394206"/>
+          </a:xfrm>
+          <a:prstGeom prst="rect">
+            <a:avLst/>
+          </a:prstGeom>
+        </p:spPr>
+      </p:pic>
+      <p:pic>
+        <p:nvPicPr>
+          <p:cNvPr id="11" name="Picture 10">
+            <a:extLst>
+              <a:ext uri="{FF2B5EF4-FFF2-40B4-BE49-F238E27FC236}">
+                <a16:creationId xmlns:a16="http://schemas.microsoft.com/office/drawing/2014/main" id="{DE3E2589-874B-ED42-9554-9C23DBCC54D8}"/>
+              </a:ext>
+            </a:extLst>
+          </p:cNvPr>
+          <p:cNvPicPr>
+            <a:picLocks noChangeAspect="1"/>
+          </p:cNvPicPr>
+          <p:nvPr/>
+        </p:nvPicPr>
+        <p:blipFill>
+          <a:blip r:embed="rId6"/>
+          <a:stretch>
+            <a:fillRect/>
+          </a:stretch>
+        </p:blipFill>
+        <p:spPr>
+          <a:xfrm>
+            <a:off x="4772787" y="1876956"/>
+            <a:ext cx="773629" cy="394206"/>
+          </a:xfrm>
+          <a:prstGeom prst="rect">
+            <a:avLst/>
+          </a:prstGeom>
+        </p:spPr>
+      </p:pic>
+      <p:pic>
+        <p:nvPicPr>
+          <p:cNvPr id="18" name="Picture 17">
+            <a:extLst>
+              <a:ext uri="{FF2B5EF4-FFF2-40B4-BE49-F238E27FC236}">
+                <a16:creationId xmlns:a16="http://schemas.microsoft.com/office/drawing/2014/main" id="{FA939149-2571-3146-B40E-88FB57DA64A2}"/>
+              </a:ext>
+            </a:extLst>
+          </p:cNvPr>
+          <p:cNvPicPr>
+            <a:picLocks noChangeAspect="1"/>
+          </p:cNvPicPr>
+          <p:nvPr/>
+        </p:nvPicPr>
+        <p:blipFill>
+          <a:blip r:embed="rId6"/>
+          <a:stretch>
+            <a:fillRect/>
+          </a:stretch>
+        </p:blipFill>
+        <p:spPr>
+          <a:xfrm>
+            <a:off x="2960585" y="3650177"/>
+            <a:ext cx="773629" cy="394206"/>
+          </a:xfrm>
+          <a:prstGeom prst="rect">
+            <a:avLst/>
+          </a:prstGeom>
+        </p:spPr>
+      </p:pic>
+      <p:pic>
+        <p:nvPicPr>
+          <p:cNvPr id="19" name="Picture 18" descr="A picture containing clipart&#10;&#10;Description automatically generated">
+            <a:extLst>
+              <a:ext uri="{FF2B5EF4-FFF2-40B4-BE49-F238E27FC236}">
+                <a16:creationId xmlns:a16="http://schemas.microsoft.com/office/drawing/2014/main" id="{6DF91C68-05CD-E541-8698-0681BA762267}"/>
+              </a:ext>
+            </a:extLst>
+          </p:cNvPr>
+          <p:cNvPicPr>
+            <a:picLocks noChangeAspect="1"/>
+          </p:cNvPicPr>
+          <p:nvPr/>
+        </p:nvPicPr>
+        <p:blipFill>
+          <a:blip r:embed="rId5"/>
+          <a:stretch>
+            <a:fillRect/>
+          </a:stretch>
+        </p:blipFill>
+        <p:spPr>
+          <a:xfrm>
+            <a:off x="9419034" y="1840742"/>
+            <a:ext cx="773630" cy="394206"/>
+          </a:xfrm>
+          <a:prstGeom prst="rect">
+            <a:avLst/>
+          </a:prstGeom>
+        </p:spPr>
+      </p:pic>
+      <p:pic>
+        <p:nvPicPr>
+          <p:cNvPr id="20" name="Picture 19" descr="A picture containing text, clipart&#10;&#10;Description automatically generated">
+            <a:extLst>
+              <a:ext uri="{FF2B5EF4-FFF2-40B4-BE49-F238E27FC236}">
+                <a16:creationId xmlns:a16="http://schemas.microsoft.com/office/drawing/2014/main" id="{E9E8632F-8056-F64B-92D2-702AA23D598B}"/>
+              </a:ext>
+            </a:extLst>
+          </p:cNvPr>
+          <p:cNvPicPr>
+            <a:picLocks noChangeAspect="1"/>
+          </p:cNvPicPr>
+          <p:nvPr/>
+        </p:nvPicPr>
+        <p:blipFill>
+          <a:blip r:embed="rId4"/>
+          <a:stretch>
+            <a:fillRect/>
+          </a:stretch>
+        </p:blipFill>
+        <p:spPr>
+          <a:xfrm>
+            <a:off x="7630446" y="2779008"/>
+            <a:ext cx="602171" cy="306560"/>
+          </a:xfrm>
+          <a:prstGeom prst="rect">
+            <a:avLst/>
+          </a:prstGeom>
+        </p:spPr>
+      </p:pic>
+    </p:spTree>
+    <p:extLst>
+      <p:ext uri="{BB962C8B-B14F-4D97-AF65-F5344CB8AC3E}">
+        <p14:creationId xmlns:p14="http://schemas.microsoft.com/office/powerpoint/2010/main" val="768670400"/>
+      </p:ext>
+    </p:extLst>
+  </p:cSld>
+  <p:clrMapOvr>
+    <a:masterClrMapping/>
+  </p:clrMapOvr>
+</p:sld>
+</file>
+
 <file path=ppt/theme/theme1.xml><?xml version="1.0" encoding="utf-8"?>
 <a:theme xmlns:a="http://schemas.openxmlformats.org/drawingml/2006/main" name="Office Theme">
   <a:themeElements>

</xml_diff>